<commit_message>
Finished up with Hillary
</commit_message>
<xml_diff>
--- a/Presentation.pptx
+++ b/Presentation.pptx
@@ -5,7 +5,7 @@
     <p:sldMasterId id="2147483660" r:id="rId1"/>
   </p:sldMasterIdLst>
   <p:notesMasterIdLst>
-    <p:notesMasterId r:id="rId21"/>
+    <p:notesMasterId r:id="rId27"/>
   </p:notesMasterIdLst>
   <p:sldIdLst>
     <p:sldId id="256" r:id="rId2"/>
@@ -21,12 +21,18 @@
     <p:sldId id="309" r:id="rId12"/>
     <p:sldId id="298" r:id="rId13"/>
     <p:sldId id="305" r:id="rId14"/>
-    <p:sldId id="318" r:id="rId15"/>
-    <p:sldId id="316" r:id="rId16"/>
-    <p:sldId id="315" r:id="rId17"/>
-    <p:sldId id="307" r:id="rId18"/>
-    <p:sldId id="296" r:id="rId19"/>
-    <p:sldId id="299" r:id="rId20"/>
+    <p:sldId id="316" r:id="rId15"/>
+    <p:sldId id="318" r:id="rId16"/>
+    <p:sldId id="320" r:id="rId17"/>
+    <p:sldId id="321" r:id="rId18"/>
+    <p:sldId id="322" r:id="rId19"/>
+    <p:sldId id="323" r:id="rId20"/>
+    <p:sldId id="319" r:id="rId21"/>
+    <p:sldId id="324" r:id="rId22"/>
+    <p:sldId id="325" r:id="rId23"/>
+    <p:sldId id="327" r:id="rId24"/>
+    <p:sldId id="326" r:id="rId25"/>
+    <p:sldId id="328" r:id="rId26"/>
   </p:sldIdLst>
   <p:sldSz cx="12192000" cy="6858000"/>
   <p:notesSz cx="6858000" cy="9144000"/>
@@ -131,6 +137,32 @@
     </p:ext>
   </p:extLst>
 </p:presentation>
+</file>
+
+<file path=ppt/ink/ink1.xml><?xml version="1.0" encoding="utf-8"?>
+<inkml:ink xmlns:inkml="http://www.w3.org/2003/InkML">
+  <inkml:definitions>
+    <inkml:context xml:id="ctx0">
+      <inkml:inkSource xml:id="inkSrc0">
+        <inkml:traceFormat>
+          <inkml:channel name="X" type="integer" min="-2.14748E9" max="2.14748E9" units="cm"/>
+          <inkml:channel name="Y" type="integer" min="-2.14748E9" max="2.14748E9" units="cm"/>
+        </inkml:traceFormat>
+        <inkml:channelProperties>
+          <inkml:channelProperty channel="X" name="resolution" value="1000" units="1/cm"/>
+          <inkml:channelProperty channel="Y" name="resolution" value="1000" units="1/cm"/>
+        </inkml:channelProperties>
+      </inkml:inkSource>
+      <inkml:timestamp xml:id="ts0" timeString="2021-04-12T11:06:51.524"/>
+    </inkml:context>
+    <inkml:brush xml:id="br0">
+      <inkml:brushProperty name="width" value="0.05" units="cm"/>
+      <inkml:brushProperty name="height" value="0.05" units="cm"/>
+      <inkml:brushProperty name="ignorePressure" value="1"/>
+    </inkml:brush>
+  </inkml:definitions>
+  <inkml:trace contextRef="#ctx0" brushRef="#br0">484 1,'-5'0,"-7"0,-7 0,-6 0,-3 0,-19 0,-12 0,-1 0,4 0,6 0,7 0,0 0,6 0</inkml:trace>
+</inkml:ink>
 </file>
 
 <file path=ppt/notesMasters/notesMaster1.xml><?xml version="1.0" encoding="utf-8"?>
@@ -587,6 +619,273 @@
 </p:notes>
 </file>
 
+<file path=ppt/notesSlides/notesSlide10.xml><?xml version="1.0" encoding="utf-8"?>
+<p:notes xmlns:a="http://schemas.openxmlformats.org/drawingml/2006/main" xmlns:r="http://schemas.openxmlformats.org/officeDocument/2006/relationships" xmlns:p="http://schemas.openxmlformats.org/presentationml/2006/main">
+  <p:cSld>
+    <p:spTree>
+      <p:nvGrpSpPr>
+        <p:cNvPr id="1" name=""/>
+        <p:cNvGrpSpPr/>
+        <p:nvPr/>
+      </p:nvGrpSpPr>
+      <p:grpSpPr>
+        <a:xfrm>
+          <a:off x="0" y="0"/>
+          <a:ext cx="0" cy="0"/>
+          <a:chOff x="0" y="0"/>
+          <a:chExt cx="0" cy="0"/>
+        </a:xfrm>
+      </p:grpSpPr>
+      <p:sp>
+        <p:nvSpPr>
+          <p:cNvPr id="2" name="Slide Image Placeholder 1"/>
+          <p:cNvSpPr>
+            <a:spLocks noGrp="1" noRot="1" noChangeAspect="1"/>
+          </p:cNvSpPr>
+          <p:nvPr>
+            <p:ph type="sldImg"/>
+          </p:nvPr>
+        </p:nvSpPr>
+        <p:spPr/>
+      </p:sp>
+      <p:sp>
+        <p:nvSpPr>
+          <p:cNvPr id="3" name="Notes Placeholder 2"/>
+          <p:cNvSpPr>
+            <a:spLocks noGrp="1"/>
+          </p:cNvSpPr>
+          <p:nvPr>
+            <p:ph type="body" idx="1"/>
+          </p:nvPr>
+        </p:nvSpPr>
+        <p:spPr/>
+        <p:txBody>
+          <a:bodyPr/>
+          <a:lstStyle/>
+          <a:p>
+            <a:r>
+              <a:rPr lang="en-AU" dirty="0"/>
+              <a:t>56:40</a:t>
+            </a:r>
+          </a:p>
+        </p:txBody>
+      </p:sp>
+      <p:sp>
+        <p:nvSpPr>
+          <p:cNvPr id="4" name="Slide Number Placeholder 3"/>
+          <p:cNvSpPr>
+            <a:spLocks noGrp="1"/>
+          </p:cNvSpPr>
+          <p:nvPr>
+            <p:ph type="sldNum" sz="quarter" idx="5"/>
+          </p:nvPr>
+        </p:nvSpPr>
+        <p:spPr/>
+        <p:txBody>
+          <a:bodyPr/>
+          <a:lstStyle/>
+          <a:p>
+            <a:fld id="{7B56CC48-A98B-46D2-A920-CEC1553D294A}" type="slidenum">
+              <a:rPr lang="en-AU" smtClean="0"/>
+              <a:t>22</a:t>
+            </a:fld>
+            <a:endParaRPr lang="en-AU"/>
+          </a:p>
+        </p:txBody>
+      </p:sp>
+    </p:spTree>
+    <p:extLst>
+      <p:ext uri="{BB962C8B-B14F-4D97-AF65-F5344CB8AC3E}">
+        <p14:creationId xmlns:p14="http://schemas.microsoft.com/office/powerpoint/2010/main" val="1467223910"/>
+      </p:ext>
+    </p:extLst>
+  </p:cSld>
+  <p:clrMapOvr>
+    <a:masterClrMapping/>
+  </p:clrMapOvr>
+</p:notes>
+</file>
+
+<file path=ppt/notesSlides/notesSlide11.xml><?xml version="1.0" encoding="utf-8"?>
+<p:notes xmlns:a="http://schemas.openxmlformats.org/drawingml/2006/main" xmlns:r="http://schemas.openxmlformats.org/officeDocument/2006/relationships" xmlns:p="http://schemas.openxmlformats.org/presentationml/2006/main">
+  <p:cSld>
+    <p:spTree>
+      <p:nvGrpSpPr>
+        <p:cNvPr id="1" name=""/>
+        <p:cNvGrpSpPr/>
+        <p:nvPr/>
+      </p:nvGrpSpPr>
+      <p:grpSpPr>
+        <a:xfrm>
+          <a:off x="0" y="0"/>
+          <a:ext cx="0" cy="0"/>
+          <a:chOff x="0" y="0"/>
+          <a:chExt cx="0" cy="0"/>
+        </a:xfrm>
+      </p:grpSpPr>
+      <p:sp>
+        <p:nvSpPr>
+          <p:cNvPr id="2" name="Slide Image Placeholder 1"/>
+          <p:cNvSpPr>
+            <a:spLocks noGrp="1" noRot="1" noChangeAspect="1"/>
+          </p:cNvSpPr>
+          <p:nvPr>
+            <p:ph type="sldImg"/>
+          </p:nvPr>
+        </p:nvSpPr>
+        <p:spPr/>
+      </p:sp>
+      <p:sp>
+        <p:nvSpPr>
+          <p:cNvPr id="3" name="Notes Placeholder 2"/>
+          <p:cNvSpPr>
+            <a:spLocks noGrp="1"/>
+          </p:cNvSpPr>
+          <p:nvPr>
+            <p:ph type="body" idx="1"/>
+          </p:nvPr>
+        </p:nvSpPr>
+        <p:spPr/>
+        <p:txBody>
+          <a:bodyPr/>
+          <a:lstStyle/>
+          <a:p>
+            <a:r>
+              <a:rPr lang="en-AU" dirty="0"/>
+              <a:t>60</a:t>
+            </a:r>
+          </a:p>
+          <a:p>
+            <a:endParaRPr lang="en-AU" dirty="0"/>
+          </a:p>
+        </p:txBody>
+      </p:sp>
+      <p:sp>
+        <p:nvSpPr>
+          <p:cNvPr id="4" name="Slide Number Placeholder 3"/>
+          <p:cNvSpPr>
+            <a:spLocks noGrp="1"/>
+          </p:cNvSpPr>
+          <p:nvPr>
+            <p:ph type="sldNum" sz="quarter" idx="5"/>
+          </p:nvPr>
+        </p:nvSpPr>
+        <p:spPr/>
+        <p:txBody>
+          <a:bodyPr/>
+          <a:lstStyle/>
+          <a:p>
+            <a:fld id="{7B56CC48-A98B-46D2-A920-CEC1553D294A}" type="slidenum">
+              <a:rPr lang="en-AU" smtClean="0"/>
+              <a:t>23</a:t>
+            </a:fld>
+            <a:endParaRPr lang="en-AU"/>
+          </a:p>
+        </p:txBody>
+      </p:sp>
+    </p:spTree>
+    <p:extLst>
+      <p:ext uri="{BB962C8B-B14F-4D97-AF65-F5344CB8AC3E}">
+        <p14:creationId xmlns:p14="http://schemas.microsoft.com/office/powerpoint/2010/main" val="2656895649"/>
+      </p:ext>
+    </p:extLst>
+  </p:cSld>
+  <p:clrMapOvr>
+    <a:masterClrMapping/>
+  </p:clrMapOvr>
+</p:notes>
+</file>
+
+<file path=ppt/notesSlides/notesSlide12.xml><?xml version="1.0" encoding="utf-8"?>
+<p:notes xmlns:a="http://schemas.openxmlformats.org/drawingml/2006/main" xmlns:r="http://schemas.openxmlformats.org/officeDocument/2006/relationships" xmlns:p="http://schemas.openxmlformats.org/presentationml/2006/main">
+  <p:cSld>
+    <p:spTree>
+      <p:nvGrpSpPr>
+        <p:cNvPr id="1" name=""/>
+        <p:cNvGrpSpPr/>
+        <p:nvPr/>
+      </p:nvGrpSpPr>
+      <p:grpSpPr>
+        <a:xfrm>
+          <a:off x="0" y="0"/>
+          <a:ext cx="0" cy="0"/>
+          <a:chOff x="0" y="0"/>
+          <a:chExt cx="0" cy="0"/>
+        </a:xfrm>
+      </p:grpSpPr>
+      <p:sp>
+        <p:nvSpPr>
+          <p:cNvPr id="2" name="Slide Image Placeholder 1"/>
+          <p:cNvSpPr>
+            <a:spLocks noGrp="1" noRot="1" noChangeAspect="1"/>
+          </p:cNvSpPr>
+          <p:nvPr>
+            <p:ph type="sldImg"/>
+          </p:nvPr>
+        </p:nvSpPr>
+        <p:spPr/>
+      </p:sp>
+      <p:sp>
+        <p:nvSpPr>
+          <p:cNvPr id="3" name="Notes Placeholder 2"/>
+          <p:cNvSpPr>
+            <a:spLocks noGrp="1"/>
+          </p:cNvSpPr>
+          <p:nvPr>
+            <p:ph type="body" idx="1"/>
+          </p:nvPr>
+        </p:nvSpPr>
+        <p:spPr/>
+        <p:txBody>
+          <a:bodyPr/>
+          <a:lstStyle/>
+          <a:p>
+            <a:r>
+              <a:rPr lang="en-AU" dirty="0"/>
+              <a:t>65</a:t>
+            </a:r>
+          </a:p>
+          <a:p>
+            <a:endParaRPr lang="en-AU" dirty="0"/>
+          </a:p>
+        </p:txBody>
+      </p:sp>
+      <p:sp>
+        <p:nvSpPr>
+          <p:cNvPr id="4" name="Slide Number Placeholder 3"/>
+          <p:cNvSpPr>
+            <a:spLocks noGrp="1"/>
+          </p:cNvSpPr>
+          <p:nvPr>
+            <p:ph type="sldNum" sz="quarter" idx="5"/>
+          </p:nvPr>
+        </p:nvSpPr>
+        <p:spPr/>
+        <p:txBody>
+          <a:bodyPr/>
+          <a:lstStyle/>
+          <a:p>
+            <a:fld id="{7B56CC48-A98B-46D2-A920-CEC1553D294A}" type="slidenum">
+              <a:rPr lang="en-AU" smtClean="0"/>
+              <a:t>24</a:t>
+            </a:fld>
+            <a:endParaRPr lang="en-AU"/>
+          </a:p>
+        </p:txBody>
+      </p:sp>
+    </p:spTree>
+    <p:extLst>
+      <p:ext uri="{BB962C8B-B14F-4D97-AF65-F5344CB8AC3E}">
+        <p14:creationId xmlns:p14="http://schemas.microsoft.com/office/powerpoint/2010/main" val="3761833782"/>
+      </p:ext>
+    </p:extLst>
+  </p:cSld>
+  <p:clrMapOvr>
+    <a:masterClrMapping/>
+  </p:clrMapOvr>
+</p:notes>
+</file>
+
 <file path=ppt/notesSlides/notesSlide2.xml><?xml version="1.0" encoding="utf-8"?>
 <p:notes xmlns:a="http://schemas.openxmlformats.org/drawingml/2006/main" xmlns:r="http://schemas.openxmlformats.org/officeDocument/2006/relationships" xmlns:p="http://schemas.openxmlformats.org/presentationml/2006/main">
   <p:cSld>
@@ -636,6 +935,15 @@
               <a:t>Laptop coding is infinitely easier!</a:t>
             </a:r>
           </a:p>
+          <a:p>
+            <a:endParaRPr lang="en-AU" dirty="0"/>
+          </a:p>
+          <a:p>
+            <a:r>
+              <a:rPr lang="en-AU" dirty="0"/>
+              <a:t>Much more intuitive! Commands make sense! Shortcuts make sense…</a:t>
+            </a:r>
+          </a:p>
         </p:txBody>
       </p:sp>
       <p:sp>
@@ -665,6 +973,644 @@
     <p:extLst>
       <p:ext uri="{BB962C8B-B14F-4D97-AF65-F5344CB8AC3E}">
         <p14:creationId xmlns:p14="http://schemas.microsoft.com/office/powerpoint/2010/main" val="1887245315"/>
+      </p:ext>
+    </p:extLst>
+  </p:cSld>
+  <p:clrMapOvr>
+    <a:masterClrMapping/>
+  </p:clrMapOvr>
+</p:notes>
+</file>
+
+<file path=ppt/notesSlides/notesSlide3.xml><?xml version="1.0" encoding="utf-8"?>
+<p:notes xmlns:a="http://schemas.openxmlformats.org/drawingml/2006/main" xmlns:r="http://schemas.openxmlformats.org/officeDocument/2006/relationships" xmlns:p="http://schemas.openxmlformats.org/presentationml/2006/main">
+  <p:cSld>
+    <p:spTree>
+      <p:nvGrpSpPr>
+        <p:cNvPr id="1" name=""/>
+        <p:cNvGrpSpPr/>
+        <p:nvPr/>
+      </p:nvGrpSpPr>
+      <p:grpSpPr>
+        <a:xfrm>
+          <a:off x="0" y="0"/>
+          <a:ext cx="0" cy="0"/>
+          <a:chOff x="0" y="0"/>
+          <a:chExt cx="0" cy="0"/>
+        </a:xfrm>
+      </p:grpSpPr>
+      <p:sp>
+        <p:nvSpPr>
+          <p:cNvPr id="2" name="Slide Image Placeholder 1"/>
+          <p:cNvSpPr>
+            <a:spLocks noGrp="1" noRot="1" noChangeAspect="1"/>
+          </p:cNvSpPr>
+          <p:nvPr>
+            <p:ph type="sldImg"/>
+          </p:nvPr>
+        </p:nvSpPr>
+        <p:spPr/>
+      </p:sp>
+      <p:sp>
+        <p:nvSpPr>
+          <p:cNvPr id="3" name="Notes Placeholder 2"/>
+          <p:cNvSpPr>
+            <a:spLocks noGrp="1"/>
+          </p:cNvSpPr>
+          <p:nvPr>
+            <p:ph type="body" idx="1"/>
+          </p:nvPr>
+        </p:nvSpPr>
+        <p:spPr/>
+        <p:txBody>
+          <a:bodyPr/>
+          <a:lstStyle/>
+          <a:p>
+            <a:pPr marL="0" marR="0" lvl="0" indent="0" algn="l" defTabSz="914400" rtl="0" eaLnBrk="1" fontAlgn="auto" latinLnBrk="0" hangingPunct="1">
+              <a:lnSpc>
+                <a:spcPct val="100000"/>
+              </a:lnSpc>
+              <a:spcBef>
+                <a:spcPts val="0"/>
+              </a:spcBef>
+              <a:spcAft>
+                <a:spcPts val="0"/>
+              </a:spcAft>
+              <a:buClrTx/>
+              <a:buSzTx/>
+              <a:buFontTx/>
+              <a:buNone/>
+              <a:tabLst/>
+              <a:defRPr/>
+            </a:pPr>
+            <a:r>
+              <a:rPr lang="en-AU" dirty="0"/>
+              <a:t>10:40m</a:t>
+            </a:r>
+          </a:p>
+          <a:p>
+            <a:endParaRPr lang="en-AU" dirty="0"/>
+          </a:p>
+        </p:txBody>
+      </p:sp>
+      <p:sp>
+        <p:nvSpPr>
+          <p:cNvPr id="4" name="Slide Number Placeholder 3"/>
+          <p:cNvSpPr>
+            <a:spLocks noGrp="1"/>
+          </p:cNvSpPr>
+          <p:nvPr>
+            <p:ph type="sldNum" sz="quarter" idx="5"/>
+          </p:nvPr>
+        </p:nvSpPr>
+        <p:spPr/>
+        <p:txBody>
+          <a:bodyPr/>
+          <a:lstStyle/>
+          <a:p>
+            <a:fld id="{7B56CC48-A98B-46D2-A920-CEC1553D294A}" type="slidenum">
+              <a:rPr lang="en-AU" smtClean="0"/>
+              <a:t>14</a:t>
+            </a:fld>
+            <a:endParaRPr lang="en-AU"/>
+          </a:p>
+        </p:txBody>
+      </p:sp>
+    </p:spTree>
+    <p:extLst>
+      <p:ext uri="{BB962C8B-B14F-4D97-AF65-F5344CB8AC3E}">
+        <p14:creationId xmlns:p14="http://schemas.microsoft.com/office/powerpoint/2010/main" val="3056840846"/>
+      </p:ext>
+    </p:extLst>
+  </p:cSld>
+  <p:clrMapOvr>
+    <a:masterClrMapping/>
+  </p:clrMapOvr>
+</p:notes>
+</file>
+
+<file path=ppt/notesSlides/notesSlide4.xml><?xml version="1.0" encoding="utf-8"?>
+<p:notes xmlns:a="http://schemas.openxmlformats.org/drawingml/2006/main" xmlns:r="http://schemas.openxmlformats.org/officeDocument/2006/relationships" xmlns:p="http://schemas.openxmlformats.org/presentationml/2006/main">
+  <p:cSld>
+    <p:spTree>
+      <p:nvGrpSpPr>
+        <p:cNvPr id="1" name=""/>
+        <p:cNvGrpSpPr/>
+        <p:nvPr/>
+      </p:nvGrpSpPr>
+      <p:grpSpPr>
+        <a:xfrm>
+          <a:off x="0" y="0"/>
+          <a:ext cx="0" cy="0"/>
+          <a:chOff x="0" y="0"/>
+          <a:chExt cx="0" cy="0"/>
+        </a:xfrm>
+      </p:grpSpPr>
+      <p:sp>
+        <p:nvSpPr>
+          <p:cNvPr id="2" name="Slide Image Placeholder 1"/>
+          <p:cNvSpPr>
+            <a:spLocks noGrp="1" noRot="1" noChangeAspect="1"/>
+          </p:cNvSpPr>
+          <p:nvPr>
+            <p:ph type="sldImg"/>
+          </p:nvPr>
+        </p:nvSpPr>
+        <p:spPr/>
+      </p:sp>
+      <p:sp>
+        <p:nvSpPr>
+          <p:cNvPr id="3" name="Notes Placeholder 2"/>
+          <p:cNvSpPr>
+            <a:spLocks noGrp="1"/>
+          </p:cNvSpPr>
+          <p:nvPr>
+            <p:ph type="body" idx="1"/>
+          </p:nvPr>
+        </p:nvSpPr>
+        <p:spPr/>
+        <p:txBody>
+          <a:bodyPr/>
+          <a:lstStyle/>
+          <a:p>
+            <a:r>
+              <a:rPr lang="en-AU" dirty="0"/>
+              <a:t>18:40</a:t>
+            </a:r>
+          </a:p>
+          <a:p>
+            <a:endParaRPr lang="en-AU" dirty="0"/>
+          </a:p>
+        </p:txBody>
+      </p:sp>
+      <p:sp>
+        <p:nvSpPr>
+          <p:cNvPr id="4" name="Slide Number Placeholder 3"/>
+          <p:cNvSpPr>
+            <a:spLocks noGrp="1"/>
+          </p:cNvSpPr>
+          <p:nvPr>
+            <p:ph type="sldNum" sz="quarter" idx="5"/>
+          </p:nvPr>
+        </p:nvSpPr>
+        <p:spPr/>
+        <p:txBody>
+          <a:bodyPr/>
+          <a:lstStyle/>
+          <a:p>
+            <a:fld id="{7B56CC48-A98B-46D2-A920-CEC1553D294A}" type="slidenum">
+              <a:rPr lang="en-AU" smtClean="0"/>
+              <a:t>15</a:t>
+            </a:fld>
+            <a:endParaRPr lang="en-AU"/>
+          </a:p>
+        </p:txBody>
+      </p:sp>
+    </p:spTree>
+    <p:extLst>
+      <p:ext uri="{BB962C8B-B14F-4D97-AF65-F5344CB8AC3E}">
+        <p14:creationId xmlns:p14="http://schemas.microsoft.com/office/powerpoint/2010/main" val="911032713"/>
+      </p:ext>
+    </p:extLst>
+  </p:cSld>
+  <p:clrMapOvr>
+    <a:masterClrMapping/>
+  </p:clrMapOvr>
+</p:notes>
+</file>
+
+<file path=ppt/notesSlides/notesSlide5.xml><?xml version="1.0" encoding="utf-8"?>
+<p:notes xmlns:a="http://schemas.openxmlformats.org/drawingml/2006/main" xmlns:r="http://schemas.openxmlformats.org/officeDocument/2006/relationships" xmlns:p="http://schemas.openxmlformats.org/presentationml/2006/main">
+  <p:cSld>
+    <p:spTree>
+      <p:nvGrpSpPr>
+        <p:cNvPr id="1" name=""/>
+        <p:cNvGrpSpPr/>
+        <p:nvPr/>
+      </p:nvGrpSpPr>
+      <p:grpSpPr>
+        <a:xfrm>
+          <a:off x="0" y="0"/>
+          <a:ext cx="0" cy="0"/>
+          <a:chOff x="0" y="0"/>
+          <a:chExt cx="0" cy="0"/>
+        </a:xfrm>
+      </p:grpSpPr>
+      <p:sp>
+        <p:nvSpPr>
+          <p:cNvPr id="2" name="Slide Image Placeholder 1"/>
+          <p:cNvSpPr>
+            <a:spLocks noGrp="1" noRot="1" noChangeAspect="1"/>
+          </p:cNvSpPr>
+          <p:nvPr>
+            <p:ph type="sldImg"/>
+          </p:nvPr>
+        </p:nvSpPr>
+        <p:spPr/>
+      </p:sp>
+      <p:sp>
+        <p:nvSpPr>
+          <p:cNvPr id="3" name="Notes Placeholder 2"/>
+          <p:cNvSpPr>
+            <a:spLocks noGrp="1"/>
+          </p:cNvSpPr>
+          <p:nvPr>
+            <p:ph type="body" idx="1"/>
+          </p:nvPr>
+        </p:nvSpPr>
+        <p:spPr/>
+        <p:txBody>
+          <a:bodyPr/>
+          <a:lstStyle/>
+          <a:p>
+            <a:r>
+              <a:rPr lang="en-AU" dirty="0"/>
+              <a:t>23:40</a:t>
+            </a:r>
+          </a:p>
+        </p:txBody>
+      </p:sp>
+      <p:sp>
+        <p:nvSpPr>
+          <p:cNvPr id="4" name="Slide Number Placeholder 3"/>
+          <p:cNvSpPr>
+            <a:spLocks noGrp="1"/>
+          </p:cNvSpPr>
+          <p:nvPr>
+            <p:ph type="sldNum" sz="quarter" idx="5"/>
+          </p:nvPr>
+        </p:nvSpPr>
+        <p:spPr/>
+        <p:txBody>
+          <a:bodyPr/>
+          <a:lstStyle/>
+          <a:p>
+            <a:fld id="{7B56CC48-A98B-46D2-A920-CEC1553D294A}" type="slidenum">
+              <a:rPr lang="en-AU" smtClean="0"/>
+              <a:t>16</a:t>
+            </a:fld>
+            <a:endParaRPr lang="en-AU"/>
+          </a:p>
+        </p:txBody>
+      </p:sp>
+    </p:spTree>
+    <p:extLst>
+      <p:ext uri="{BB962C8B-B14F-4D97-AF65-F5344CB8AC3E}">
+        <p14:creationId xmlns:p14="http://schemas.microsoft.com/office/powerpoint/2010/main" val="871367328"/>
+      </p:ext>
+    </p:extLst>
+  </p:cSld>
+  <p:clrMapOvr>
+    <a:masterClrMapping/>
+  </p:clrMapOvr>
+</p:notes>
+</file>
+
+<file path=ppt/notesSlides/notesSlide6.xml><?xml version="1.0" encoding="utf-8"?>
+<p:notes xmlns:a="http://schemas.openxmlformats.org/drawingml/2006/main" xmlns:r="http://schemas.openxmlformats.org/officeDocument/2006/relationships" xmlns:p="http://schemas.openxmlformats.org/presentationml/2006/main">
+  <p:cSld>
+    <p:spTree>
+      <p:nvGrpSpPr>
+        <p:cNvPr id="1" name=""/>
+        <p:cNvGrpSpPr/>
+        <p:nvPr/>
+      </p:nvGrpSpPr>
+      <p:grpSpPr>
+        <a:xfrm>
+          <a:off x="0" y="0"/>
+          <a:ext cx="0" cy="0"/>
+          <a:chOff x="0" y="0"/>
+          <a:chExt cx="0" cy="0"/>
+        </a:xfrm>
+      </p:grpSpPr>
+      <p:sp>
+        <p:nvSpPr>
+          <p:cNvPr id="2" name="Slide Image Placeholder 1"/>
+          <p:cNvSpPr>
+            <a:spLocks noGrp="1" noRot="1" noChangeAspect="1"/>
+          </p:cNvSpPr>
+          <p:nvPr>
+            <p:ph type="sldImg"/>
+          </p:nvPr>
+        </p:nvSpPr>
+        <p:spPr/>
+      </p:sp>
+      <p:sp>
+        <p:nvSpPr>
+          <p:cNvPr id="3" name="Notes Placeholder 2"/>
+          <p:cNvSpPr>
+            <a:spLocks noGrp="1"/>
+          </p:cNvSpPr>
+          <p:nvPr>
+            <p:ph type="body" idx="1"/>
+          </p:nvPr>
+        </p:nvSpPr>
+        <p:spPr/>
+        <p:txBody>
+          <a:bodyPr/>
+          <a:lstStyle/>
+          <a:p>
+            <a:r>
+              <a:rPr lang="en-AU" dirty="0"/>
+              <a:t>33:40</a:t>
+            </a:r>
+          </a:p>
+        </p:txBody>
+      </p:sp>
+      <p:sp>
+        <p:nvSpPr>
+          <p:cNvPr id="4" name="Slide Number Placeholder 3"/>
+          <p:cNvSpPr>
+            <a:spLocks noGrp="1"/>
+          </p:cNvSpPr>
+          <p:nvPr>
+            <p:ph type="sldNum" sz="quarter" idx="5"/>
+          </p:nvPr>
+        </p:nvSpPr>
+        <p:spPr/>
+        <p:txBody>
+          <a:bodyPr/>
+          <a:lstStyle/>
+          <a:p>
+            <a:fld id="{7B56CC48-A98B-46D2-A920-CEC1553D294A}" type="slidenum">
+              <a:rPr lang="en-AU" smtClean="0"/>
+              <a:t>17</a:t>
+            </a:fld>
+            <a:endParaRPr lang="en-AU"/>
+          </a:p>
+        </p:txBody>
+      </p:sp>
+    </p:spTree>
+    <p:extLst>
+      <p:ext uri="{BB962C8B-B14F-4D97-AF65-F5344CB8AC3E}">
+        <p14:creationId xmlns:p14="http://schemas.microsoft.com/office/powerpoint/2010/main" val="2342323669"/>
+      </p:ext>
+    </p:extLst>
+  </p:cSld>
+  <p:clrMapOvr>
+    <a:masterClrMapping/>
+  </p:clrMapOvr>
+</p:notes>
+</file>
+
+<file path=ppt/notesSlides/notesSlide7.xml><?xml version="1.0" encoding="utf-8"?>
+<p:notes xmlns:a="http://schemas.openxmlformats.org/drawingml/2006/main" xmlns:r="http://schemas.openxmlformats.org/officeDocument/2006/relationships" xmlns:p="http://schemas.openxmlformats.org/presentationml/2006/main">
+  <p:cSld>
+    <p:spTree>
+      <p:nvGrpSpPr>
+        <p:cNvPr id="1" name=""/>
+        <p:cNvGrpSpPr/>
+        <p:nvPr/>
+      </p:nvGrpSpPr>
+      <p:grpSpPr>
+        <a:xfrm>
+          <a:off x="0" y="0"/>
+          <a:ext cx="0" cy="0"/>
+          <a:chOff x="0" y="0"/>
+          <a:chExt cx="0" cy="0"/>
+        </a:xfrm>
+      </p:grpSpPr>
+      <p:sp>
+        <p:nvSpPr>
+          <p:cNvPr id="2" name="Slide Image Placeholder 1"/>
+          <p:cNvSpPr>
+            <a:spLocks noGrp="1" noRot="1" noChangeAspect="1"/>
+          </p:cNvSpPr>
+          <p:nvPr>
+            <p:ph type="sldImg"/>
+          </p:nvPr>
+        </p:nvSpPr>
+        <p:spPr/>
+      </p:sp>
+      <p:sp>
+        <p:nvSpPr>
+          <p:cNvPr id="3" name="Notes Placeholder 2"/>
+          <p:cNvSpPr>
+            <a:spLocks noGrp="1"/>
+          </p:cNvSpPr>
+          <p:nvPr>
+            <p:ph type="body" idx="1"/>
+          </p:nvPr>
+        </p:nvSpPr>
+        <p:spPr/>
+        <p:txBody>
+          <a:bodyPr/>
+          <a:lstStyle/>
+          <a:p>
+            <a:r>
+              <a:rPr lang="en-AU" dirty="0"/>
+              <a:t>38:40</a:t>
+            </a:r>
+          </a:p>
+          <a:p>
+            <a:endParaRPr lang="en-AU" dirty="0"/>
+          </a:p>
+        </p:txBody>
+      </p:sp>
+      <p:sp>
+        <p:nvSpPr>
+          <p:cNvPr id="4" name="Slide Number Placeholder 3"/>
+          <p:cNvSpPr>
+            <a:spLocks noGrp="1"/>
+          </p:cNvSpPr>
+          <p:nvPr>
+            <p:ph type="sldNum" sz="quarter" idx="5"/>
+          </p:nvPr>
+        </p:nvSpPr>
+        <p:spPr/>
+        <p:txBody>
+          <a:bodyPr/>
+          <a:lstStyle/>
+          <a:p>
+            <a:fld id="{7B56CC48-A98B-46D2-A920-CEC1553D294A}" type="slidenum">
+              <a:rPr lang="en-AU" smtClean="0"/>
+              <a:t>18</a:t>
+            </a:fld>
+            <a:endParaRPr lang="en-AU"/>
+          </a:p>
+        </p:txBody>
+      </p:sp>
+    </p:spTree>
+    <p:extLst>
+      <p:ext uri="{BB962C8B-B14F-4D97-AF65-F5344CB8AC3E}">
+        <p14:creationId xmlns:p14="http://schemas.microsoft.com/office/powerpoint/2010/main" val="2185974187"/>
+      </p:ext>
+    </p:extLst>
+  </p:cSld>
+  <p:clrMapOvr>
+    <a:masterClrMapping/>
+  </p:clrMapOvr>
+</p:notes>
+</file>
+
+<file path=ppt/notesSlides/notesSlide8.xml><?xml version="1.0" encoding="utf-8"?>
+<p:notes xmlns:a="http://schemas.openxmlformats.org/drawingml/2006/main" xmlns:r="http://schemas.openxmlformats.org/officeDocument/2006/relationships" xmlns:p="http://schemas.openxmlformats.org/presentationml/2006/main">
+  <p:cSld>
+    <p:spTree>
+      <p:nvGrpSpPr>
+        <p:cNvPr id="1" name=""/>
+        <p:cNvGrpSpPr/>
+        <p:nvPr/>
+      </p:nvGrpSpPr>
+      <p:grpSpPr>
+        <a:xfrm>
+          <a:off x="0" y="0"/>
+          <a:ext cx="0" cy="0"/>
+          <a:chOff x="0" y="0"/>
+          <a:chExt cx="0" cy="0"/>
+        </a:xfrm>
+      </p:grpSpPr>
+      <p:sp>
+        <p:nvSpPr>
+          <p:cNvPr id="2" name="Slide Image Placeholder 1"/>
+          <p:cNvSpPr>
+            <a:spLocks noGrp="1" noRot="1" noChangeAspect="1"/>
+          </p:cNvSpPr>
+          <p:nvPr>
+            <p:ph type="sldImg"/>
+          </p:nvPr>
+        </p:nvSpPr>
+        <p:spPr/>
+      </p:sp>
+      <p:sp>
+        <p:nvSpPr>
+          <p:cNvPr id="3" name="Notes Placeholder 2"/>
+          <p:cNvSpPr>
+            <a:spLocks noGrp="1"/>
+          </p:cNvSpPr>
+          <p:nvPr>
+            <p:ph type="body" idx="1"/>
+          </p:nvPr>
+        </p:nvSpPr>
+        <p:spPr/>
+        <p:txBody>
+          <a:bodyPr/>
+          <a:lstStyle/>
+          <a:p>
+            <a:r>
+              <a:rPr lang="en-AU" dirty="0"/>
+              <a:t>46:40</a:t>
+            </a:r>
+          </a:p>
+          <a:p>
+            <a:endParaRPr lang="en-AU" dirty="0"/>
+          </a:p>
+        </p:txBody>
+      </p:sp>
+      <p:sp>
+        <p:nvSpPr>
+          <p:cNvPr id="4" name="Slide Number Placeholder 3"/>
+          <p:cNvSpPr>
+            <a:spLocks noGrp="1"/>
+          </p:cNvSpPr>
+          <p:nvPr>
+            <p:ph type="sldNum" sz="quarter" idx="5"/>
+          </p:nvPr>
+        </p:nvSpPr>
+        <p:spPr/>
+        <p:txBody>
+          <a:bodyPr/>
+          <a:lstStyle/>
+          <a:p>
+            <a:fld id="{7B56CC48-A98B-46D2-A920-CEC1553D294A}" type="slidenum">
+              <a:rPr lang="en-AU" smtClean="0"/>
+              <a:t>20</a:t>
+            </a:fld>
+            <a:endParaRPr lang="en-AU"/>
+          </a:p>
+        </p:txBody>
+      </p:sp>
+    </p:spTree>
+    <p:extLst>
+      <p:ext uri="{BB962C8B-B14F-4D97-AF65-F5344CB8AC3E}">
+        <p14:creationId xmlns:p14="http://schemas.microsoft.com/office/powerpoint/2010/main" val="3049997000"/>
+      </p:ext>
+    </p:extLst>
+  </p:cSld>
+  <p:clrMapOvr>
+    <a:masterClrMapping/>
+  </p:clrMapOvr>
+</p:notes>
+</file>
+
+<file path=ppt/notesSlides/notesSlide9.xml><?xml version="1.0" encoding="utf-8"?>
+<p:notes xmlns:a="http://schemas.openxmlformats.org/drawingml/2006/main" xmlns:r="http://schemas.openxmlformats.org/officeDocument/2006/relationships" xmlns:p="http://schemas.openxmlformats.org/presentationml/2006/main">
+  <p:cSld>
+    <p:spTree>
+      <p:nvGrpSpPr>
+        <p:cNvPr id="1" name=""/>
+        <p:cNvGrpSpPr/>
+        <p:nvPr/>
+      </p:nvGrpSpPr>
+      <p:grpSpPr>
+        <a:xfrm>
+          <a:off x="0" y="0"/>
+          <a:ext cx="0" cy="0"/>
+          <a:chOff x="0" y="0"/>
+          <a:chExt cx="0" cy="0"/>
+        </a:xfrm>
+      </p:grpSpPr>
+      <p:sp>
+        <p:nvSpPr>
+          <p:cNvPr id="2" name="Slide Image Placeholder 1"/>
+          <p:cNvSpPr>
+            <a:spLocks noGrp="1" noRot="1" noChangeAspect="1"/>
+          </p:cNvSpPr>
+          <p:nvPr>
+            <p:ph type="sldImg"/>
+          </p:nvPr>
+        </p:nvSpPr>
+        <p:spPr/>
+      </p:sp>
+      <p:sp>
+        <p:nvSpPr>
+          <p:cNvPr id="3" name="Notes Placeholder 2"/>
+          <p:cNvSpPr>
+            <a:spLocks noGrp="1"/>
+          </p:cNvSpPr>
+          <p:nvPr>
+            <p:ph type="body" idx="1"/>
+          </p:nvPr>
+        </p:nvSpPr>
+        <p:spPr/>
+        <p:txBody>
+          <a:bodyPr/>
+          <a:lstStyle/>
+          <a:p>
+            <a:r>
+              <a:rPr lang="en-AU" dirty="0"/>
+              <a:t>51:40</a:t>
+            </a:r>
+          </a:p>
+        </p:txBody>
+      </p:sp>
+      <p:sp>
+        <p:nvSpPr>
+          <p:cNvPr id="4" name="Slide Number Placeholder 3"/>
+          <p:cNvSpPr>
+            <a:spLocks noGrp="1"/>
+          </p:cNvSpPr>
+          <p:nvPr>
+            <p:ph type="sldNum" sz="quarter" idx="5"/>
+          </p:nvPr>
+        </p:nvSpPr>
+        <p:spPr/>
+        <p:txBody>
+          <a:bodyPr/>
+          <a:lstStyle/>
+          <a:p>
+            <a:fld id="{7B56CC48-A98B-46D2-A920-CEC1553D294A}" type="slidenum">
+              <a:rPr lang="en-AU" smtClean="0"/>
+              <a:t>21</a:t>
+            </a:fld>
+            <a:endParaRPr lang="en-AU"/>
+          </a:p>
+        </p:txBody>
+      </p:sp>
+    </p:spTree>
+    <p:extLst>
+      <p:ext uri="{BB962C8B-B14F-4D97-AF65-F5344CB8AC3E}">
+        <p14:creationId xmlns:p14="http://schemas.microsoft.com/office/powerpoint/2010/main" val="2787947154"/>
       </p:ext>
     </p:extLst>
   </p:cSld>
@@ -8868,6 +9814,92 @@
           </a:extLst>
         </p:spPr>
       </p:pic>
+      <p:sp>
+        <p:nvSpPr>
+          <p:cNvPr id="2" name="TextBox 1">
+            <a:extLst>
+              <a:ext uri="{FF2B5EF4-FFF2-40B4-BE49-F238E27FC236}">
+                <a16:creationId xmlns:a16="http://schemas.microsoft.com/office/drawing/2014/main" id="{25EA6B09-D3A2-46FF-888C-492C95271E99}"/>
+              </a:ext>
+            </a:extLst>
+          </p:cNvPr>
+          <p:cNvSpPr txBox="1"/>
+          <p:nvPr/>
+        </p:nvSpPr>
+        <p:spPr>
+          <a:xfrm>
+            <a:off x="5330579" y="4928538"/>
+            <a:ext cx="1342034" cy="369332"/>
+          </a:xfrm>
+          <a:prstGeom prst="rect">
+            <a:avLst/>
+          </a:prstGeom>
+          <a:noFill/>
+        </p:spPr>
+        <p:txBody>
+          <a:bodyPr wrap="none" rtlCol="0">
+            <a:spAutoFit/>
+          </a:bodyPr>
+          <a:lstStyle/>
+          <a:p>
+            <a:r>
+              <a:rPr lang="en-AU" dirty="0"/>
+              <a:t>Exiting vim</a:t>
+            </a:r>
+          </a:p>
+        </p:txBody>
+      </p:sp>
+      <mc:AlternateContent xmlns:mc="http://schemas.openxmlformats.org/markup-compatibility/2006" xmlns:p14="http://schemas.microsoft.com/office/powerpoint/2010/main">
+        <mc:Choice Requires="p14">
+          <p:contentPart p14:bwMode="auto" r:id="rId3">
+            <p14:nvContentPartPr>
+              <p14:cNvPr id="5" name="Ink 4">
+                <a:extLst>
+                  <a:ext uri="{FF2B5EF4-FFF2-40B4-BE49-F238E27FC236}">
+                    <a16:creationId xmlns:a16="http://schemas.microsoft.com/office/drawing/2014/main" id="{1DD7E871-6C4B-4AD0-83B9-8AE5D1971461}"/>
+                  </a:ext>
+                </a:extLst>
+              </p14:cNvPr>
+              <p14:cNvContentPartPr/>
+              <p14:nvPr/>
+            </p14:nvContentPartPr>
+            <p14:xfrm>
+              <a:off x="5210120" y="5113204"/>
+              <a:ext cx="174600" cy="360"/>
+            </p14:xfrm>
+          </p:contentPart>
+        </mc:Choice>
+        <mc:Fallback xmlns="">
+          <p:pic>
+            <p:nvPicPr>
+              <p:cNvPr id="5" name="Ink 4">
+                <a:extLst>
+                  <a:ext uri="{FF2B5EF4-FFF2-40B4-BE49-F238E27FC236}">
+                    <a16:creationId xmlns:a16="http://schemas.microsoft.com/office/drawing/2014/main" id="{1DD7E871-6C4B-4AD0-83B9-8AE5D1971461}"/>
+                  </a:ext>
+                </a:extLst>
+              </p:cNvPr>
+              <p:cNvPicPr/>
+              <p:nvPr/>
+            </p:nvPicPr>
+            <p:blipFill>
+              <a:blip r:embed="rId4"/>
+              <a:stretch>
+                <a:fillRect/>
+              </a:stretch>
+            </p:blipFill>
+            <p:spPr>
+              <a:xfrm>
+                <a:off x="5201120" y="5104564"/>
+                <a:ext cx="192240" cy="18000"/>
+              </a:xfrm>
+              <a:prstGeom prst="rect">
+                <a:avLst/>
+              </a:prstGeom>
+            </p:spPr>
+          </p:pic>
+        </mc:Fallback>
+      </mc:AlternateContent>
     </p:spTree>
     <p:extLst>
       <p:ext uri="{BB962C8B-B14F-4D97-AF65-F5344CB8AC3E}">
@@ -8991,7 +10023,7 @@
           <p:cNvPr id="2" name="Title 1">
             <a:extLst>
               <a:ext uri="{FF2B5EF4-FFF2-40B4-BE49-F238E27FC236}">
-                <a16:creationId xmlns:a16="http://schemas.microsoft.com/office/drawing/2014/main" id="{C389045C-C94A-40D8-AD0B-5BE0C212775B}"/>
+                <a16:creationId xmlns:a16="http://schemas.microsoft.com/office/drawing/2014/main" id="{083195BA-7999-445D-8743-A137F44058B3}"/>
               </a:ext>
             </a:extLst>
           </p:cNvPr>
@@ -9002,27 +10034,100 @@
             <p:ph type="title"/>
           </p:nvPr>
         </p:nvSpPr>
-        <p:spPr>
-          <a:xfrm>
-            <a:off x="3521367" y="3154245"/>
-            <a:ext cx="8911687" cy="1280890"/>
-          </a:xfrm>
-        </p:spPr>
+        <p:spPr/>
         <p:txBody>
           <a:bodyPr/>
           <a:lstStyle/>
           <a:p>
             <a:r>
               <a:rPr lang="en-AU" dirty="0"/>
-              <a:t>Let’s actually get started…!</a:t>
-            </a:r>
+              <a:t>How to get the most out of this talk… </a:t>
+            </a:r>
+          </a:p>
+        </p:txBody>
+      </p:sp>
+      <p:sp>
+        <p:nvSpPr>
+          <p:cNvPr id="3" name="Content Placeholder 2">
+            <a:extLst>
+              <a:ext uri="{FF2B5EF4-FFF2-40B4-BE49-F238E27FC236}">
+                <a16:creationId xmlns:a16="http://schemas.microsoft.com/office/drawing/2014/main" id="{64DFDE2D-53B2-454A-9409-1CCD8B88B285}"/>
+              </a:ext>
+            </a:extLst>
+          </p:cNvPr>
+          <p:cNvSpPr>
+            <a:spLocks noGrp="1"/>
+          </p:cNvSpPr>
+          <p:nvPr>
+            <p:ph idx="1"/>
+          </p:nvPr>
+        </p:nvSpPr>
+        <p:spPr/>
+        <p:txBody>
+          <a:bodyPr/>
+          <a:lstStyle/>
+          <a:p>
+            <a:r>
+              <a:rPr lang="en-AU" dirty="0"/>
+              <a:t>Sit back, relax, and enjoy!</a:t>
+            </a:r>
+          </a:p>
+          <a:p>
+            <a:endParaRPr lang="en-AU" dirty="0"/>
+          </a:p>
+          <a:p>
+            <a:r>
+              <a:rPr lang="en-AU" dirty="0"/>
+              <a:t>The goal is to give you guys exposure, to let you know what is out there.</a:t>
+            </a:r>
+          </a:p>
+          <a:p>
+            <a:endParaRPr lang="en-AU" dirty="0"/>
+          </a:p>
+          <a:p>
+            <a:r>
+              <a:rPr lang="en-AU" dirty="0"/>
+              <a:t>Feel free to download these slides afterwards and try it out on your own </a:t>
+            </a:r>
+            <a:r>
+              <a:rPr lang="en-AU" dirty="0">
+                <a:sym typeface="Wingdings" panose="05000000000000000000" pitchFamily="2" charset="2"/>
+              </a:rPr>
+              <a:t>.</a:t>
+            </a:r>
+          </a:p>
+          <a:p>
+            <a:endParaRPr lang="en-AU" dirty="0">
+              <a:sym typeface="Wingdings" panose="05000000000000000000" pitchFamily="2" charset="2"/>
+            </a:endParaRPr>
+          </a:p>
+          <a:p>
+            <a:r>
+              <a:rPr lang="en-AU" dirty="0">
+                <a:sym typeface="Wingdings" panose="05000000000000000000" pitchFamily="2" charset="2"/>
+              </a:rPr>
+              <a:t>Taking notes or following along will drain you too quickly and you’ll miss what is really important! (</a:t>
+            </a:r>
+            <a:r>
+              <a:rPr lang="en-AU" dirty="0" err="1">
+                <a:sym typeface="Wingdings" panose="05000000000000000000" pitchFamily="2" charset="2"/>
+              </a:rPr>
+              <a:t>imo</a:t>
+            </a:r>
+            <a:r>
+              <a:rPr lang="en-AU" dirty="0">
+                <a:sym typeface="Wingdings" panose="05000000000000000000" pitchFamily="2" charset="2"/>
+              </a:rPr>
+              <a:t> at least)</a:t>
+            </a:r>
+            <a:endParaRPr lang="en-AU" dirty="0"/>
           </a:p>
         </p:txBody>
       </p:sp>
     </p:spTree>
     <p:extLst>
       <p:ext uri="{BB962C8B-B14F-4D97-AF65-F5344CB8AC3E}">
-        <p14:creationId xmlns:p14="http://schemas.microsoft.com/office/powerpoint/2010/main" val="3126940345"/>
+        <p14:creationId xmlns:p14="http://schemas.microsoft.com/office/powerpoint/2010/main" val="559393519"/>
       </p:ext>
     </p:extLst>
   </p:cSld>
@@ -9054,7 +10159,7 @@
           <p:cNvPr id="2" name="Title 1">
             <a:extLst>
               <a:ext uri="{FF2B5EF4-FFF2-40B4-BE49-F238E27FC236}">
-                <a16:creationId xmlns:a16="http://schemas.microsoft.com/office/drawing/2014/main" id="{083195BA-7999-445D-8743-A137F44058B3}"/>
+                <a16:creationId xmlns:a16="http://schemas.microsoft.com/office/drawing/2014/main" id="{C389045C-C94A-40D8-AD0B-5BE0C212775B}"/>
               </a:ext>
             </a:extLst>
           </p:cNvPr>
@@ -9065,100 +10170,27 @@
             <p:ph type="title"/>
           </p:nvPr>
         </p:nvSpPr>
-        <p:spPr/>
+        <p:spPr>
+          <a:xfrm>
+            <a:off x="3521367" y="3154245"/>
+            <a:ext cx="8911687" cy="1280890"/>
+          </a:xfrm>
+        </p:spPr>
         <p:txBody>
           <a:bodyPr/>
           <a:lstStyle/>
           <a:p>
             <a:r>
               <a:rPr lang="en-AU" dirty="0"/>
-              <a:t>How to get the most out of this talk… </a:t>
-            </a:r>
-          </a:p>
-        </p:txBody>
-      </p:sp>
-      <p:sp>
-        <p:nvSpPr>
-          <p:cNvPr id="3" name="Content Placeholder 2">
-            <a:extLst>
-              <a:ext uri="{FF2B5EF4-FFF2-40B4-BE49-F238E27FC236}">
-                <a16:creationId xmlns:a16="http://schemas.microsoft.com/office/drawing/2014/main" id="{64DFDE2D-53B2-454A-9409-1CCD8B88B285}"/>
-              </a:ext>
-            </a:extLst>
-          </p:cNvPr>
-          <p:cNvSpPr>
-            <a:spLocks noGrp="1"/>
-          </p:cNvSpPr>
-          <p:nvPr>
-            <p:ph idx="1"/>
-          </p:nvPr>
-        </p:nvSpPr>
-        <p:spPr/>
-        <p:txBody>
-          <a:bodyPr/>
-          <a:lstStyle/>
-          <a:p>
-            <a:r>
-              <a:rPr lang="en-AU" dirty="0"/>
-              <a:t>Sit back, relax, and enjoy!</a:t>
-            </a:r>
-          </a:p>
-          <a:p>
-            <a:endParaRPr lang="en-AU" dirty="0"/>
-          </a:p>
-          <a:p>
-            <a:r>
-              <a:rPr lang="en-AU" dirty="0"/>
-              <a:t>The goal is to give you guys exposure, to let you know what is out there.</a:t>
-            </a:r>
-          </a:p>
-          <a:p>
-            <a:endParaRPr lang="en-AU" dirty="0"/>
-          </a:p>
-          <a:p>
-            <a:r>
-              <a:rPr lang="en-AU" dirty="0"/>
-              <a:t>Feel free to download these slides afterwards and try it out on your own </a:t>
-            </a:r>
-            <a:r>
-              <a:rPr lang="en-AU" dirty="0">
-                <a:sym typeface="Wingdings" panose="05000000000000000000" pitchFamily="2" charset="2"/>
-              </a:rPr>
-              <a:t>.</a:t>
-            </a:r>
-          </a:p>
-          <a:p>
-            <a:endParaRPr lang="en-AU" dirty="0">
-              <a:sym typeface="Wingdings" panose="05000000000000000000" pitchFamily="2" charset="2"/>
-            </a:endParaRPr>
-          </a:p>
-          <a:p>
-            <a:r>
-              <a:rPr lang="en-AU" dirty="0">
-                <a:sym typeface="Wingdings" panose="05000000000000000000" pitchFamily="2" charset="2"/>
-              </a:rPr>
-              <a:t>Taking notes or following along will drain you too quickly and you’ll miss what is really important! (</a:t>
-            </a:r>
-            <a:r>
-              <a:rPr lang="en-AU" dirty="0" err="1">
-                <a:sym typeface="Wingdings" panose="05000000000000000000" pitchFamily="2" charset="2"/>
-              </a:rPr>
-              <a:t>imo</a:t>
-            </a:r>
-            <a:r>
-              <a:rPr lang="en-AU" dirty="0">
-                <a:sym typeface="Wingdings" panose="05000000000000000000" pitchFamily="2" charset="2"/>
-              </a:rPr>
-              <a:t> at least)</a:t>
-            </a:r>
-            <a:endParaRPr lang="en-AU" dirty="0"/>
+              <a:t>Let’s actually get started…!</a:t>
+            </a:r>
           </a:p>
         </p:txBody>
       </p:sp>
     </p:spTree>
     <p:extLst>
       <p:ext uri="{BB962C8B-B14F-4D97-AF65-F5344CB8AC3E}">
-        <p14:creationId xmlns:p14="http://schemas.microsoft.com/office/powerpoint/2010/main" val="559393519"/>
+        <p14:creationId xmlns:p14="http://schemas.microsoft.com/office/powerpoint/2010/main" val="3126940345"/>
       </p:ext>
     </p:extLst>
   </p:cSld>
@@ -9190,7 +10222,7 @@
           <p:cNvPr id="2" name="Title 1">
             <a:extLst>
               <a:ext uri="{FF2B5EF4-FFF2-40B4-BE49-F238E27FC236}">
-                <a16:creationId xmlns:a16="http://schemas.microsoft.com/office/drawing/2014/main" id="{F4431661-A1F1-473F-8C2D-05293D43DBCD}"/>
+                <a16:creationId xmlns:a16="http://schemas.microsoft.com/office/drawing/2014/main" id="{F53214A5-A8BE-4F48-B445-BA4F078BCA27}"/>
               </a:ext>
             </a:extLst>
           </p:cNvPr>
@@ -9208,7 +10240,7 @@
           <a:p>
             <a:r>
               <a:rPr lang="en-AU" dirty="0"/>
-              <a:t>How to open and close vim…</a:t>
+              <a:t>5 minute break!</a:t>
             </a:r>
           </a:p>
         </p:txBody>
@@ -9218,7 +10250,7 @@
           <p:cNvPr id="3" name="Content Placeholder 2">
             <a:extLst>
               <a:ext uri="{FF2B5EF4-FFF2-40B4-BE49-F238E27FC236}">
-                <a16:creationId xmlns:a16="http://schemas.microsoft.com/office/drawing/2014/main" id="{C7C01161-F314-4F1E-98E2-2CF8B792230F}"/>
+                <a16:creationId xmlns:a16="http://schemas.microsoft.com/office/drawing/2014/main" id="{1B3A56EC-3B84-4ED6-AEEC-014C0342A841}"/>
               </a:ext>
             </a:extLst>
           </p:cNvPr>
@@ -9231,53 +10263,22 @@
         </p:nvSpPr>
         <p:spPr/>
         <p:txBody>
-          <a:bodyPr/>
+          <a:bodyPr>
+            <a:normAutofit/>
+          </a:bodyPr>
           <a:lstStyle/>
           <a:p>
             <a:r>
-              <a:rPr lang="en-AU" dirty="0"/>
-              <a:t>To start vim, type </a:t>
-            </a:r>
-            <a:r>
-              <a:rPr lang="en-AU" dirty="0">
-                <a:highlight>
-                  <a:srgbClr val="C0C0C0"/>
-                </a:highlight>
-              </a:rPr>
-              <a:t>vim</a:t>
-            </a:r>
-            <a:r>
-              <a:rPr lang="en-AU" dirty="0"/>
-              <a:t> into a terminal.</a:t>
-            </a:r>
-          </a:p>
-          <a:p>
-            <a:r>
-              <a:rPr lang="en-AU" dirty="0"/>
-              <a:t>To exit vim, type </a:t>
-            </a:r>
-            <a:r>
-              <a:rPr lang="en-AU" dirty="0">
-                <a:highlight>
-                  <a:srgbClr val="C0C0C0"/>
-                </a:highlight>
-              </a:rPr>
-              <a:t>:q</a:t>
-            </a:r>
-            <a:r>
-              <a:rPr lang="en-AU" dirty="0"/>
-              <a:t>.</a:t>
-            </a:r>
-          </a:p>
-          <a:p>
-            <a:endParaRPr lang="en-AU" dirty="0"/>
+              <a:rPr lang="en-AU" sz="3600" dirty="0"/>
+              <a:t>First 5 people can VIM-BE-GOOD!</a:t>
+            </a:r>
           </a:p>
         </p:txBody>
       </p:sp>
     </p:spTree>
     <p:extLst>
       <p:ext uri="{BB962C8B-B14F-4D97-AF65-F5344CB8AC3E}">
-        <p14:creationId xmlns:p14="http://schemas.microsoft.com/office/powerpoint/2010/main" val="1419735949"/>
+        <p14:creationId xmlns:p14="http://schemas.microsoft.com/office/powerpoint/2010/main" val="2245926784"/>
       </p:ext>
     </p:extLst>
   </p:cSld>
@@ -9309,7 +10310,7 @@
           <p:cNvPr id="2" name="Title 1">
             <a:extLst>
               <a:ext uri="{FF2B5EF4-FFF2-40B4-BE49-F238E27FC236}">
-                <a16:creationId xmlns:a16="http://schemas.microsoft.com/office/drawing/2014/main" id="{05C02A74-897D-40B7-A85E-248B3E591AB1}"/>
+                <a16:creationId xmlns:a16="http://schemas.microsoft.com/office/drawing/2014/main" id="{50C608F7-188D-4BC9-85E1-04C7810CCD74}"/>
               </a:ext>
             </a:extLst>
           </p:cNvPr>
@@ -9326,12 +10327,8 @@
           <a:lstStyle/>
           <a:p>
             <a:r>
-              <a:rPr lang="en-AU" dirty="0" err="1"/>
-              <a:t>hjkl</a:t>
-            </a:r>
-            <a:r>
               <a:rPr lang="en-AU" dirty="0"/>
-              <a:t> – the holy quartet</a:t>
+              <a:t>More complex Vim…</a:t>
             </a:r>
           </a:p>
         </p:txBody>
@@ -9341,7 +10338,7 @@
           <p:cNvPr id="3" name="Content Placeholder 2">
             <a:extLst>
               <a:ext uri="{FF2B5EF4-FFF2-40B4-BE49-F238E27FC236}">
-                <a16:creationId xmlns:a16="http://schemas.microsoft.com/office/drawing/2014/main" id="{EB62A508-7888-4F9C-A230-7DFDD57C8AE9}"/>
+                <a16:creationId xmlns:a16="http://schemas.microsoft.com/office/drawing/2014/main" id="{A45CDBF6-E48B-446D-9932-DBD3A497E699}"/>
               </a:ext>
             </a:extLst>
           </p:cNvPr>
@@ -9357,14 +10354,17 @@
           <a:bodyPr/>
           <a:lstStyle/>
           <a:p>
-            <a:endParaRPr lang="en-AU" dirty="0"/>
+            <a:r>
+              <a:rPr lang="en-AU" dirty="0"/>
+              <a:t>Macro</a:t>
+            </a:r>
           </a:p>
         </p:txBody>
       </p:sp>
     </p:spTree>
     <p:extLst>
       <p:ext uri="{BB962C8B-B14F-4D97-AF65-F5344CB8AC3E}">
-        <p14:creationId xmlns:p14="http://schemas.microsoft.com/office/powerpoint/2010/main" val="1413483907"/>
+        <p14:creationId xmlns:p14="http://schemas.microsoft.com/office/powerpoint/2010/main" val="843071020"/>
       </p:ext>
     </p:extLst>
   </p:cSld>
@@ -9391,40 +10391,63 @@
           <a:chExt cx="0" cy="0"/>
         </a:xfrm>
       </p:grpSpPr>
-      <p:pic>
-        <p:nvPicPr>
-          <p:cNvPr id="5" name="Picture 4">
+      <p:sp>
+        <p:nvSpPr>
+          <p:cNvPr id="2" name="Title 1">
             <a:extLst>
               <a:ext uri="{FF2B5EF4-FFF2-40B4-BE49-F238E27FC236}">
-                <a16:creationId xmlns:a16="http://schemas.microsoft.com/office/drawing/2014/main" id="{FC56CF51-554F-430B-B79A-D56AD01B5C9B}"/>
+                <a16:creationId xmlns:a16="http://schemas.microsoft.com/office/drawing/2014/main" id="{87C24787-FDBA-4A3B-8F7F-FFDB35A2D6D5}"/>
               </a:ext>
             </a:extLst>
           </p:cNvPr>
-          <p:cNvPicPr>
-            <a:picLocks noChangeAspect="1"/>
-          </p:cNvPicPr>
-          <p:nvPr/>
-        </p:nvPicPr>
-        <p:blipFill>
-          <a:blip r:embed="rId2"/>
-          <a:stretch>
-            <a:fillRect/>
-          </a:stretch>
-        </p:blipFill>
-        <p:spPr>
-          <a:xfrm>
-            <a:off x="3180943" y="1357023"/>
-            <a:ext cx="5830114" cy="4143953"/>
-          </a:xfrm>
-          <a:prstGeom prst="rect">
-            <a:avLst/>
-          </a:prstGeom>
-        </p:spPr>
-      </p:pic>
+          <p:cNvSpPr>
+            <a:spLocks noGrp="1"/>
+          </p:cNvSpPr>
+          <p:nvPr>
+            <p:ph type="title"/>
+          </p:nvPr>
+        </p:nvSpPr>
+        <p:spPr/>
+        <p:txBody>
+          <a:bodyPr/>
+          <a:lstStyle/>
+          <a:p>
+            <a:r>
+              <a:rPr lang="en-AU" dirty="0"/>
+              <a:t>Intermission programming example with application of learnt stuff</a:t>
+            </a:r>
+          </a:p>
+        </p:txBody>
+      </p:sp>
+      <p:sp>
+        <p:nvSpPr>
+          <p:cNvPr id="3" name="Content Placeholder 2">
+            <a:extLst>
+              <a:ext uri="{FF2B5EF4-FFF2-40B4-BE49-F238E27FC236}">
+                <a16:creationId xmlns:a16="http://schemas.microsoft.com/office/drawing/2014/main" id="{62FEC06C-67FE-4E52-941B-6D00B10537B6}"/>
+              </a:ext>
+            </a:extLst>
+          </p:cNvPr>
+          <p:cNvSpPr>
+            <a:spLocks noGrp="1"/>
+          </p:cNvSpPr>
+          <p:nvPr>
+            <p:ph idx="1"/>
+          </p:nvPr>
+        </p:nvSpPr>
+        <p:spPr/>
+        <p:txBody>
+          <a:bodyPr/>
+          <a:lstStyle/>
+          <a:p>
+            <a:endParaRPr lang="en-AU"/>
+          </a:p>
+        </p:txBody>
+      </p:sp>
     </p:spTree>
     <p:extLst>
       <p:ext uri="{BB962C8B-B14F-4D97-AF65-F5344CB8AC3E}">
-        <p14:creationId xmlns:p14="http://schemas.microsoft.com/office/powerpoint/2010/main" val="37866159"/>
+        <p14:creationId xmlns:p14="http://schemas.microsoft.com/office/powerpoint/2010/main" val="2497835573"/>
       </p:ext>
     </p:extLst>
   </p:cSld>
@@ -9451,40 +10474,247 @@
           <a:chExt cx="0" cy="0"/>
         </a:xfrm>
       </p:grpSpPr>
-      <p:pic>
-        <p:nvPicPr>
-          <p:cNvPr id="5" name="Picture 4">
+      <p:sp>
+        <p:nvSpPr>
+          <p:cNvPr id="2" name="Title 1">
             <a:extLst>
               <a:ext uri="{FF2B5EF4-FFF2-40B4-BE49-F238E27FC236}">
-                <a16:creationId xmlns:a16="http://schemas.microsoft.com/office/drawing/2014/main" id="{9187D617-3FF5-4734-908B-48167379D417}"/>
+                <a16:creationId xmlns:a16="http://schemas.microsoft.com/office/drawing/2014/main" id="{2F0FC48E-F975-427C-8B96-14668E60F18D}"/>
               </a:ext>
             </a:extLst>
           </p:cNvPr>
-          <p:cNvPicPr>
-            <a:picLocks noChangeAspect="1"/>
-          </p:cNvPicPr>
-          <p:nvPr/>
-        </p:nvPicPr>
-        <p:blipFill>
-          <a:blip r:embed="rId2"/>
-          <a:stretch>
-            <a:fillRect/>
-          </a:stretch>
-        </p:blipFill>
-        <p:spPr>
-          <a:xfrm>
-            <a:off x="2565594" y="703627"/>
-            <a:ext cx="7060812" cy="5292701"/>
-          </a:xfrm>
-          <a:prstGeom prst="rect">
-            <a:avLst/>
-          </a:prstGeom>
-        </p:spPr>
-      </p:pic>
+          <p:cNvSpPr>
+            <a:spLocks noGrp="1"/>
+          </p:cNvSpPr>
+          <p:nvPr>
+            <p:ph type="title"/>
+          </p:nvPr>
+        </p:nvSpPr>
+        <p:spPr/>
+        <p:txBody>
+          <a:bodyPr/>
+          <a:lstStyle/>
+          <a:p>
+            <a:r>
+              <a:rPr lang="en-AU" dirty="0"/>
+              <a:t>Plugins</a:t>
+            </a:r>
+          </a:p>
+        </p:txBody>
+      </p:sp>
+      <p:sp>
+        <p:nvSpPr>
+          <p:cNvPr id="3" name="Content Placeholder 2">
+            <a:extLst>
+              <a:ext uri="{FF2B5EF4-FFF2-40B4-BE49-F238E27FC236}">
+                <a16:creationId xmlns:a16="http://schemas.microsoft.com/office/drawing/2014/main" id="{E9FE17A7-1947-4A64-B6DB-4E707E6A463C}"/>
+              </a:ext>
+            </a:extLst>
+          </p:cNvPr>
+          <p:cNvSpPr>
+            <a:spLocks noGrp="1"/>
+          </p:cNvSpPr>
+          <p:nvPr>
+            <p:ph idx="1"/>
+          </p:nvPr>
+        </p:nvSpPr>
+        <p:spPr/>
+        <p:txBody>
+          <a:bodyPr>
+            <a:normAutofit fontScale="92500" lnSpcReduction="20000"/>
+          </a:bodyPr>
+          <a:lstStyle/>
+          <a:p>
+            <a:r>
+              <a:rPr lang="en-AU" dirty="0"/>
+              <a:t>Recommended:</a:t>
+            </a:r>
+          </a:p>
+          <a:p>
+            <a:pPr lvl="1"/>
+            <a:r>
+              <a:rPr lang="en-AU" sz="1700" dirty="0"/>
+              <a:t>Plug '</a:t>
+            </a:r>
+            <a:r>
+              <a:rPr lang="en-AU" sz="1700" dirty="0" err="1"/>
+              <a:t>junegunn</a:t>
+            </a:r>
+            <a:r>
+              <a:rPr lang="en-AU" sz="1700" dirty="0"/>
+              <a:t>/</a:t>
+            </a:r>
+            <a:r>
+              <a:rPr lang="en-AU" sz="1700" dirty="0" err="1"/>
+              <a:t>fzf</a:t>
+            </a:r>
+            <a:r>
+              <a:rPr lang="en-AU" sz="1700" dirty="0"/>
+              <a:t>', { 'do': { -&gt; </a:t>
+            </a:r>
+            <a:r>
+              <a:rPr lang="en-AU" sz="1700" dirty="0" err="1"/>
+              <a:t>fzf#install</a:t>
+            </a:r>
+            <a:r>
+              <a:rPr lang="en-AU" sz="1700" dirty="0"/>
+              <a:t>()  }  } " fuzzy find </a:t>
+            </a:r>
+          </a:p>
+          <a:p>
+            <a:pPr lvl="1"/>
+            <a:r>
+              <a:rPr lang="en-AU" sz="1700" dirty="0"/>
+              <a:t>Plug '</a:t>
+            </a:r>
+            <a:r>
+              <a:rPr lang="en-AU" sz="1700" dirty="0" err="1"/>
+              <a:t>junegunn</a:t>
+            </a:r>
+            <a:r>
+              <a:rPr lang="en-AU" sz="1700" dirty="0"/>
+              <a:t>/</a:t>
+            </a:r>
+            <a:r>
+              <a:rPr lang="en-AU" sz="1700" dirty="0" err="1"/>
+              <a:t>fzf.vim</a:t>
+            </a:r>
+            <a:r>
+              <a:rPr lang="en-AU" sz="1700" dirty="0"/>
+              <a:t>'</a:t>
+            </a:r>
+          </a:p>
+          <a:p>
+            <a:pPr lvl="1"/>
+            <a:r>
+              <a:rPr lang="en-AU" sz="1700" dirty="0"/>
+              <a:t>Plug '</a:t>
+            </a:r>
+            <a:r>
+              <a:rPr lang="en-AU" sz="1700" dirty="0" err="1"/>
+              <a:t>morhetz</a:t>
+            </a:r>
+            <a:r>
+              <a:rPr lang="en-AU" sz="1700" dirty="0"/>
+              <a:t>/</a:t>
+            </a:r>
+            <a:r>
+              <a:rPr lang="en-AU" sz="1700" dirty="0" err="1"/>
+              <a:t>gruvbox</a:t>
+            </a:r>
+            <a:r>
+              <a:rPr lang="en-AU" sz="1700" dirty="0"/>
+              <a:t>'</a:t>
+            </a:r>
+          </a:p>
+          <a:p>
+            <a:pPr lvl="1"/>
+            <a:r>
+              <a:rPr lang="en-AU" sz="1700" dirty="0"/>
+              <a:t>Plug '</a:t>
+            </a:r>
+            <a:r>
+              <a:rPr lang="en-AU" sz="1700" dirty="0" err="1"/>
+              <a:t>tpope</a:t>
+            </a:r>
+            <a:r>
+              <a:rPr lang="en-AU" sz="1700" dirty="0"/>
+              <a:t>/vim-commentary' </a:t>
+            </a:r>
+          </a:p>
+          <a:p>
+            <a:pPr lvl="1"/>
+            <a:r>
+              <a:rPr lang="en-AU" sz="1700" dirty="0"/>
+              <a:t>Plug '</a:t>
+            </a:r>
+            <a:r>
+              <a:rPr lang="en-AU" sz="1700" dirty="0" err="1"/>
+              <a:t>preservim</a:t>
+            </a:r>
+            <a:r>
+              <a:rPr lang="en-AU" sz="1700" dirty="0"/>
+              <a:t>/</a:t>
+            </a:r>
+            <a:r>
+              <a:rPr lang="en-AU" sz="1700" dirty="0" err="1"/>
+              <a:t>nerdtree</a:t>
+            </a:r>
+            <a:r>
+              <a:rPr lang="en-AU" sz="1700" dirty="0"/>
+              <a:t>'</a:t>
+            </a:r>
+          </a:p>
+          <a:p>
+            <a:pPr lvl="1"/>
+            <a:r>
+              <a:rPr lang="en-AU" sz="1700" dirty="0"/>
+              <a:t>Plug '</a:t>
+            </a:r>
+            <a:r>
+              <a:rPr lang="en-AU" sz="1700" dirty="0" err="1"/>
+              <a:t>tpope</a:t>
+            </a:r>
+            <a:r>
+              <a:rPr lang="en-AU" sz="1700" dirty="0"/>
+              <a:t>/vim-surround'</a:t>
+            </a:r>
+          </a:p>
+          <a:p>
+            <a:pPr lvl="1"/>
+            <a:r>
+              <a:rPr lang="en-AU" sz="1700" dirty="0"/>
+              <a:t>Plug '</a:t>
+            </a:r>
+            <a:r>
+              <a:rPr lang="en-AU" sz="1700" dirty="0" err="1"/>
+              <a:t>jiangmiao</a:t>
+            </a:r>
+            <a:r>
+              <a:rPr lang="en-AU" sz="1700" dirty="0"/>
+              <a:t>/auto-pairs'</a:t>
+            </a:r>
+          </a:p>
+          <a:p>
+            <a:pPr lvl="1"/>
+            <a:endParaRPr lang="en-AU" sz="1700" dirty="0"/>
+          </a:p>
+          <a:p>
+            <a:pPr lvl="1"/>
+            <a:r>
+              <a:rPr lang="en-AU" sz="1700" dirty="0"/>
+              <a:t>&lt;your language syntax highlighter&gt;</a:t>
+            </a:r>
+          </a:p>
+          <a:p>
+            <a:pPr lvl="1"/>
+            <a:r>
+              <a:rPr lang="en-AU" sz="1700" dirty="0"/>
+              <a:t>&lt;</a:t>
+            </a:r>
+            <a:r>
+              <a:rPr lang="en-AU" sz="1700" dirty="0" err="1"/>
+              <a:t>Intellisense</a:t>
+            </a:r>
+            <a:r>
+              <a:rPr lang="en-AU" sz="1700" dirty="0"/>
+              <a:t> recommend COC&gt;</a:t>
+            </a:r>
+          </a:p>
+          <a:p>
+            <a:pPr lvl="1"/>
+            <a:endParaRPr lang="en-AU" dirty="0"/>
+          </a:p>
+          <a:p>
+            <a:pPr lvl="1"/>
+            <a:endParaRPr lang="en-AU" dirty="0"/>
+          </a:p>
+        </p:txBody>
+      </p:sp>
     </p:spTree>
     <p:extLst>
       <p:ext uri="{BB962C8B-B14F-4D97-AF65-F5344CB8AC3E}">
-        <p14:creationId xmlns:p14="http://schemas.microsoft.com/office/powerpoint/2010/main" val="2244645330"/>
+        <p14:creationId xmlns:p14="http://schemas.microsoft.com/office/powerpoint/2010/main" val="2723615013"/>
       </p:ext>
     </p:extLst>
   </p:cSld>
@@ -9616,6 +10846,695 @@
     <p:extLst>
       <p:ext uri="{BB962C8B-B14F-4D97-AF65-F5344CB8AC3E}">
         <p14:creationId xmlns:p14="http://schemas.microsoft.com/office/powerpoint/2010/main" val="162528104"/>
+      </p:ext>
+    </p:extLst>
+  </p:cSld>
+  <p:clrMapOvr>
+    <a:masterClrMapping/>
+  </p:clrMapOvr>
+</p:sld>
+</file>
+
+<file path=ppt/slides/slide20.xml><?xml version="1.0" encoding="utf-8"?>
+<p:sld xmlns:a="http://schemas.openxmlformats.org/drawingml/2006/main" xmlns:r="http://schemas.openxmlformats.org/officeDocument/2006/relationships" xmlns:p="http://schemas.openxmlformats.org/presentationml/2006/main">
+  <p:cSld>
+    <p:spTree>
+      <p:nvGrpSpPr>
+        <p:cNvPr id="1" name=""/>
+        <p:cNvGrpSpPr/>
+        <p:nvPr/>
+      </p:nvGrpSpPr>
+      <p:grpSpPr>
+        <a:xfrm>
+          <a:off x="0" y="0"/>
+          <a:ext cx="0" cy="0"/>
+          <a:chOff x="0" y="0"/>
+          <a:chExt cx="0" cy="0"/>
+        </a:xfrm>
+      </p:grpSpPr>
+      <p:sp>
+        <p:nvSpPr>
+          <p:cNvPr id="2" name="Title 1">
+            <a:extLst>
+              <a:ext uri="{FF2B5EF4-FFF2-40B4-BE49-F238E27FC236}">
+                <a16:creationId xmlns:a16="http://schemas.microsoft.com/office/drawing/2014/main" id="{6C3A8A4C-AF5F-40F8-BAE2-42C1E8EFCAE6}"/>
+              </a:ext>
+            </a:extLst>
+          </p:cNvPr>
+          <p:cNvSpPr>
+            <a:spLocks noGrp="1"/>
+          </p:cNvSpPr>
+          <p:nvPr>
+            <p:ph type="title"/>
+          </p:nvPr>
+        </p:nvSpPr>
+        <p:spPr/>
+        <p:txBody>
+          <a:bodyPr/>
+          <a:lstStyle/>
+          <a:p>
+            <a:r>
+              <a:rPr lang="en-AU" dirty="0"/>
+              <a:t>Tips</a:t>
+            </a:r>
+          </a:p>
+        </p:txBody>
+      </p:sp>
+      <p:sp>
+        <p:nvSpPr>
+          <p:cNvPr id="3" name="Content Placeholder 2">
+            <a:extLst>
+              <a:ext uri="{FF2B5EF4-FFF2-40B4-BE49-F238E27FC236}">
+                <a16:creationId xmlns:a16="http://schemas.microsoft.com/office/drawing/2014/main" id="{28AF3819-1904-4272-B115-013FB741418B}"/>
+              </a:ext>
+            </a:extLst>
+          </p:cNvPr>
+          <p:cNvSpPr>
+            <a:spLocks noGrp="1"/>
+          </p:cNvSpPr>
+          <p:nvPr>
+            <p:ph idx="1"/>
+          </p:nvPr>
+        </p:nvSpPr>
+        <p:spPr/>
+        <p:txBody>
+          <a:bodyPr/>
+          <a:lstStyle/>
+          <a:p>
+            <a:r>
+              <a:rPr lang="en-AU" dirty="0"/>
+              <a:t>Always look for easier ways to do things.</a:t>
+            </a:r>
+          </a:p>
+          <a:p>
+            <a:r>
+              <a:rPr lang="en-AU" dirty="0"/>
+              <a:t>Remap caps lock to be ctrl </a:t>
+            </a:r>
+          </a:p>
+          <a:p>
+            <a:r>
+              <a:rPr lang="en-AU" dirty="0"/>
+              <a:t>Remap leader to space</a:t>
+            </a:r>
+          </a:p>
+          <a:p>
+            <a:r>
+              <a:rPr lang="en-AU" dirty="0"/>
+              <a:t>Increase the key repeat rate </a:t>
+            </a:r>
+          </a:p>
+          <a:p>
+            <a:r>
+              <a:rPr lang="en-AU" dirty="0"/>
+              <a:t>Decrease the key repeat delay (to start)</a:t>
+            </a:r>
+          </a:p>
+          <a:p>
+            <a:r>
+              <a:rPr lang="en-AU" dirty="0"/>
+              <a:t>Practise!!!</a:t>
+            </a:r>
+          </a:p>
+          <a:p>
+            <a:endParaRPr lang="en-AU" dirty="0"/>
+          </a:p>
+          <a:p>
+            <a:endParaRPr lang="en-AU" dirty="0"/>
+          </a:p>
+        </p:txBody>
+      </p:sp>
+    </p:spTree>
+    <p:extLst>
+      <p:ext uri="{BB962C8B-B14F-4D97-AF65-F5344CB8AC3E}">
+        <p14:creationId xmlns:p14="http://schemas.microsoft.com/office/powerpoint/2010/main" val="4177825512"/>
+      </p:ext>
+    </p:extLst>
+  </p:cSld>
+  <p:clrMapOvr>
+    <a:masterClrMapping/>
+  </p:clrMapOvr>
+</p:sld>
+</file>
+
+<file path=ppt/slides/slide21.xml><?xml version="1.0" encoding="utf-8"?>
+<p:sld xmlns:a="http://schemas.openxmlformats.org/drawingml/2006/main" xmlns:r="http://schemas.openxmlformats.org/officeDocument/2006/relationships" xmlns:p="http://schemas.openxmlformats.org/presentationml/2006/main">
+  <p:cSld>
+    <p:spTree>
+      <p:nvGrpSpPr>
+        <p:cNvPr id="1" name=""/>
+        <p:cNvGrpSpPr/>
+        <p:nvPr/>
+      </p:nvGrpSpPr>
+      <p:grpSpPr>
+        <a:xfrm>
+          <a:off x="0" y="0"/>
+          <a:ext cx="0" cy="0"/>
+          <a:chOff x="0" y="0"/>
+          <a:chExt cx="0" cy="0"/>
+        </a:xfrm>
+      </p:grpSpPr>
+      <p:sp>
+        <p:nvSpPr>
+          <p:cNvPr id="2" name="Title 1">
+            <a:extLst>
+              <a:ext uri="{FF2B5EF4-FFF2-40B4-BE49-F238E27FC236}">
+                <a16:creationId xmlns:a16="http://schemas.microsoft.com/office/drawing/2014/main" id="{47DE35C9-642D-4163-B5F3-6A12444C662F}"/>
+              </a:ext>
+            </a:extLst>
+          </p:cNvPr>
+          <p:cNvSpPr>
+            <a:spLocks noGrp="1"/>
+          </p:cNvSpPr>
+          <p:nvPr>
+            <p:ph type="title"/>
+          </p:nvPr>
+        </p:nvSpPr>
+        <p:spPr/>
+        <p:txBody>
+          <a:bodyPr/>
+          <a:lstStyle/>
+          <a:p>
+            <a:r>
+              <a:rPr lang="en-AU" dirty="0"/>
+              <a:t>Vim &amp; </a:t>
+            </a:r>
+            <a:r>
+              <a:rPr lang="en-AU" dirty="0" err="1"/>
+              <a:t>Tmux</a:t>
+            </a:r>
+            <a:endParaRPr lang="en-AU" dirty="0"/>
+          </a:p>
+        </p:txBody>
+      </p:sp>
+      <p:sp>
+        <p:nvSpPr>
+          <p:cNvPr id="3" name="Content Placeholder 2">
+            <a:extLst>
+              <a:ext uri="{FF2B5EF4-FFF2-40B4-BE49-F238E27FC236}">
+                <a16:creationId xmlns:a16="http://schemas.microsoft.com/office/drawing/2014/main" id="{80F6B918-CC7F-4218-9E09-67CF2C53FBB2}"/>
+              </a:ext>
+            </a:extLst>
+          </p:cNvPr>
+          <p:cNvSpPr>
+            <a:spLocks noGrp="1"/>
+          </p:cNvSpPr>
+          <p:nvPr>
+            <p:ph idx="1"/>
+          </p:nvPr>
+        </p:nvSpPr>
+        <p:spPr/>
+        <p:txBody>
+          <a:bodyPr/>
+          <a:lstStyle/>
+          <a:p>
+            <a:endParaRPr lang="en-AU"/>
+          </a:p>
+        </p:txBody>
+      </p:sp>
+      <p:pic>
+        <p:nvPicPr>
+          <p:cNvPr id="4" name="Picture 3">
+            <a:extLst>
+              <a:ext uri="{FF2B5EF4-FFF2-40B4-BE49-F238E27FC236}">
+                <a16:creationId xmlns:a16="http://schemas.microsoft.com/office/drawing/2014/main" id="{4A9578C7-515F-4DD6-ABC2-363E5EC45D35}"/>
+              </a:ext>
+            </a:extLst>
+          </p:cNvPr>
+          <p:cNvPicPr>
+            <a:picLocks noChangeAspect="1"/>
+          </p:cNvPicPr>
+          <p:nvPr/>
+        </p:nvPicPr>
+        <p:blipFill>
+          <a:blip r:embed="rId3"/>
+          <a:stretch>
+            <a:fillRect/>
+          </a:stretch>
+        </p:blipFill>
+        <p:spPr>
+          <a:xfrm>
+            <a:off x="3180943" y="2059637"/>
+            <a:ext cx="5830114" cy="4143953"/>
+          </a:xfrm>
+          <a:prstGeom prst="rect">
+            <a:avLst/>
+          </a:prstGeom>
+        </p:spPr>
+      </p:pic>
+    </p:spTree>
+    <p:extLst>
+      <p:ext uri="{BB962C8B-B14F-4D97-AF65-F5344CB8AC3E}">
+        <p14:creationId xmlns:p14="http://schemas.microsoft.com/office/powerpoint/2010/main" val="1165480283"/>
+      </p:ext>
+    </p:extLst>
+  </p:cSld>
+  <p:clrMapOvr>
+    <a:masterClrMapping/>
+  </p:clrMapOvr>
+</p:sld>
+</file>
+
+<file path=ppt/slides/slide22.xml><?xml version="1.0" encoding="utf-8"?>
+<p:sld xmlns:a="http://schemas.openxmlformats.org/drawingml/2006/main" xmlns:r="http://schemas.openxmlformats.org/officeDocument/2006/relationships" xmlns:p="http://schemas.openxmlformats.org/presentationml/2006/main">
+  <p:cSld>
+    <p:spTree>
+      <p:nvGrpSpPr>
+        <p:cNvPr id="1" name=""/>
+        <p:cNvGrpSpPr/>
+        <p:nvPr/>
+      </p:nvGrpSpPr>
+      <p:grpSpPr>
+        <a:xfrm>
+          <a:off x="0" y="0"/>
+          <a:ext cx="0" cy="0"/>
+          <a:chOff x="0" y="0"/>
+          <a:chExt cx="0" cy="0"/>
+        </a:xfrm>
+      </p:grpSpPr>
+      <p:sp>
+        <p:nvSpPr>
+          <p:cNvPr id="2" name="Title 1">
+            <a:extLst>
+              <a:ext uri="{FF2B5EF4-FFF2-40B4-BE49-F238E27FC236}">
+                <a16:creationId xmlns:a16="http://schemas.microsoft.com/office/drawing/2014/main" id="{334EC73D-80F7-4888-B4B7-6B21C1B362D4}"/>
+              </a:ext>
+            </a:extLst>
+          </p:cNvPr>
+          <p:cNvSpPr>
+            <a:spLocks noGrp="1"/>
+          </p:cNvSpPr>
+          <p:nvPr>
+            <p:ph type="title"/>
+          </p:nvPr>
+        </p:nvSpPr>
+        <p:spPr/>
+        <p:txBody>
+          <a:bodyPr/>
+          <a:lstStyle/>
+          <a:p>
+            <a:r>
+              <a:rPr lang="en-AU" dirty="0" err="1"/>
+              <a:t>Zsh</a:t>
+            </a:r>
+            <a:endParaRPr lang="en-AU" dirty="0"/>
+          </a:p>
+        </p:txBody>
+      </p:sp>
+      <p:sp>
+        <p:nvSpPr>
+          <p:cNvPr id="3" name="Content Placeholder 2">
+            <a:extLst>
+              <a:ext uri="{FF2B5EF4-FFF2-40B4-BE49-F238E27FC236}">
+                <a16:creationId xmlns:a16="http://schemas.microsoft.com/office/drawing/2014/main" id="{B4057216-DD4C-4DD7-87FC-35A19942F7C5}"/>
+              </a:ext>
+            </a:extLst>
+          </p:cNvPr>
+          <p:cNvSpPr>
+            <a:spLocks noGrp="1"/>
+          </p:cNvSpPr>
+          <p:nvPr>
+            <p:ph idx="1"/>
+          </p:nvPr>
+        </p:nvSpPr>
+        <p:spPr/>
+        <p:txBody>
+          <a:bodyPr/>
+          <a:lstStyle/>
+          <a:p>
+            <a:endParaRPr lang="en-AU"/>
+          </a:p>
+        </p:txBody>
+      </p:sp>
+    </p:spTree>
+    <p:extLst>
+      <p:ext uri="{BB962C8B-B14F-4D97-AF65-F5344CB8AC3E}">
+        <p14:creationId xmlns:p14="http://schemas.microsoft.com/office/powerpoint/2010/main" val="4070272264"/>
+      </p:ext>
+    </p:extLst>
+  </p:cSld>
+  <p:clrMapOvr>
+    <a:masterClrMapping/>
+  </p:clrMapOvr>
+</p:sld>
+</file>
+
+<file path=ppt/slides/slide23.xml><?xml version="1.0" encoding="utf-8"?>
+<p:sld xmlns:a="http://schemas.openxmlformats.org/drawingml/2006/main" xmlns:r="http://schemas.openxmlformats.org/officeDocument/2006/relationships" xmlns:p="http://schemas.openxmlformats.org/presentationml/2006/main">
+  <p:cSld>
+    <p:spTree>
+      <p:nvGrpSpPr>
+        <p:cNvPr id="1" name=""/>
+        <p:cNvGrpSpPr/>
+        <p:nvPr/>
+      </p:nvGrpSpPr>
+      <p:grpSpPr>
+        <a:xfrm>
+          <a:off x="0" y="0"/>
+          <a:ext cx="0" cy="0"/>
+          <a:chOff x="0" y="0"/>
+          <a:chExt cx="0" cy="0"/>
+        </a:xfrm>
+      </p:grpSpPr>
+      <p:sp>
+        <p:nvSpPr>
+          <p:cNvPr id="2" name="Title 1">
+            <a:extLst>
+              <a:ext uri="{FF2B5EF4-FFF2-40B4-BE49-F238E27FC236}">
+                <a16:creationId xmlns:a16="http://schemas.microsoft.com/office/drawing/2014/main" id="{9038A7A5-0607-4F85-884C-AF01E3C47116}"/>
+              </a:ext>
+            </a:extLst>
+          </p:cNvPr>
+          <p:cNvSpPr>
+            <a:spLocks noGrp="1"/>
+          </p:cNvSpPr>
+          <p:nvPr>
+            <p:ph type="title"/>
+          </p:nvPr>
+        </p:nvSpPr>
+        <p:spPr/>
+        <p:txBody>
+          <a:bodyPr/>
+          <a:lstStyle/>
+          <a:p>
+            <a:r>
+              <a:rPr lang="en-AU" dirty="0"/>
+              <a:t>Caveats</a:t>
+            </a:r>
+          </a:p>
+        </p:txBody>
+      </p:sp>
+      <p:sp>
+        <p:nvSpPr>
+          <p:cNvPr id="3" name="Content Placeholder 2">
+            <a:extLst>
+              <a:ext uri="{FF2B5EF4-FFF2-40B4-BE49-F238E27FC236}">
+                <a16:creationId xmlns:a16="http://schemas.microsoft.com/office/drawing/2014/main" id="{109B6BD9-F811-4CC1-8203-2E1600B32149}"/>
+              </a:ext>
+            </a:extLst>
+          </p:cNvPr>
+          <p:cNvSpPr>
+            <a:spLocks noGrp="1"/>
+          </p:cNvSpPr>
+          <p:nvPr>
+            <p:ph idx="1"/>
+          </p:nvPr>
+        </p:nvSpPr>
+        <p:spPr/>
+        <p:txBody>
+          <a:bodyPr/>
+          <a:lstStyle/>
+          <a:p>
+            <a:r>
+              <a:rPr lang="en-AU" dirty="0"/>
+              <a:t>Live debugging is hard… </a:t>
+            </a:r>
+          </a:p>
+          <a:p>
+            <a:r>
+              <a:rPr lang="en-AU" dirty="0"/>
+              <a:t>Installing everything on a new machine takes a bit longer than installing a single </a:t>
+            </a:r>
+            <a:r>
+              <a:rPr lang="en-AU" dirty="0" err="1"/>
+              <a:t>VSCode</a:t>
+            </a:r>
+            <a:r>
+              <a:rPr lang="en-AU" dirty="0"/>
+              <a:t> installer. </a:t>
+            </a:r>
+          </a:p>
+          <a:p>
+            <a:r>
+              <a:rPr lang="en-AU" dirty="0"/>
+              <a:t>Massive productivity drop at the start. </a:t>
+            </a:r>
+          </a:p>
+          <a:p>
+            <a:pPr lvl="1"/>
+            <a:r>
+              <a:rPr lang="en-AU" dirty="0"/>
+              <a:t>Learning all the basic shortcuts takes time…</a:t>
+            </a:r>
+          </a:p>
+          <a:p>
+            <a:pPr lvl="1"/>
+            <a:r>
+              <a:rPr lang="en-AU" dirty="0"/>
+              <a:t>Learning all the plugins takes time…</a:t>
+            </a:r>
+          </a:p>
+          <a:p>
+            <a:pPr lvl="1"/>
+            <a:r>
+              <a:rPr lang="en-AU" dirty="0"/>
+              <a:t>Configuring your new keymaps takes time… </a:t>
+            </a:r>
+          </a:p>
+          <a:p>
+            <a:endParaRPr lang="en-AU" dirty="0"/>
+          </a:p>
+        </p:txBody>
+      </p:sp>
+    </p:spTree>
+    <p:extLst>
+      <p:ext uri="{BB962C8B-B14F-4D97-AF65-F5344CB8AC3E}">
+        <p14:creationId xmlns:p14="http://schemas.microsoft.com/office/powerpoint/2010/main" val="1645886935"/>
+      </p:ext>
+    </p:extLst>
+  </p:cSld>
+  <p:clrMapOvr>
+    <a:masterClrMapping/>
+  </p:clrMapOvr>
+</p:sld>
+</file>
+
+<file path=ppt/slides/slide24.xml><?xml version="1.0" encoding="utf-8"?>
+<p:sld xmlns:a="http://schemas.openxmlformats.org/drawingml/2006/main" xmlns:r="http://schemas.openxmlformats.org/officeDocument/2006/relationships" xmlns:p="http://schemas.openxmlformats.org/presentationml/2006/main">
+  <p:cSld>
+    <p:spTree>
+      <p:nvGrpSpPr>
+        <p:cNvPr id="1" name=""/>
+        <p:cNvGrpSpPr/>
+        <p:nvPr/>
+      </p:nvGrpSpPr>
+      <p:grpSpPr>
+        <a:xfrm>
+          <a:off x="0" y="0"/>
+          <a:ext cx="0" cy="0"/>
+          <a:chOff x="0" y="0"/>
+          <a:chExt cx="0" cy="0"/>
+        </a:xfrm>
+      </p:grpSpPr>
+      <p:sp>
+        <p:nvSpPr>
+          <p:cNvPr id="2" name="Title 1">
+            <a:extLst>
+              <a:ext uri="{FF2B5EF4-FFF2-40B4-BE49-F238E27FC236}">
+                <a16:creationId xmlns:a16="http://schemas.microsoft.com/office/drawing/2014/main" id="{EE47B435-4C09-4273-A405-BB303891D8E2}"/>
+              </a:ext>
+            </a:extLst>
+          </p:cNvPr>
+          <p:cNvSpPr>
+            <a:spLocks noGrp="1"/>
+          </p:cNvSpPr>
+          <p:nvPr>
+            <p:ph type="title"/>
+          </p:nvPr>
+        </p:nvSpPr>
+        <p:spPr/>
+        <p:txBody>
+          <a:bodyPr/>
+          <a:lstStyle/>
+          <a:p>
+            <a:r>
+              <a:rPr lang="en-AU" dirty="0"/>
+              <a:t>Closing</a:t>
+            </a:r>
+          </a:p>
+        </p:txBody>
+      </p:sp>
+      <p:sp>
+        <p:nvSpPr>
+          <p:cNvPr id="3" name="Content Placeholder 2">
+            <a:extLst>
+              <a:ext uri="{FF2B5EF4-FFF2-40B4-BE49-F238E27FC236}">
+                <a16:creationId xmlns:a16="http://schemas.microsoft.com/office/drawing/2014/main" id="{9F4B1A75-296D-45D6-8E92-F7220BE2BECC}"/>
+              </a:ext>
+            </a:extLst>
+          </p:cNvPr>
+          <p:cNvSpPr>
+            <a:spLocks noGrp="1"/>
+          </p:cNvSpPr>
+          <p:nvPr>
+            <p:ph idx="1"/>
+          </p:nvPr>
+        </p:nvSpPr>
+        <p:spPr/>
+        <p:txBody>
+          <a:bodyPr/>
+          <a:lstStyle/>
+          <a:p>
+            <a:r>
+              <a:rPr lang="en-AU" dirty="0"/>
+              <a:t>Vim is HARD to get started with. </a:t>
+            </a:r>
+          </a:p>
+          <a:p>
+            <a:pPr lvl="1"/>
+            <a:r>
+              <a:rPr lang="en-AU" dirty="0"/>
+              <a:t>But it’s a long term investment on your hands (and girlfriend 😉). </a:t>
+            </a:r>
+          </a:p>
+          <a:p>
+            <a:r>
+              <a:rPr lang="en-AU" dirty="0"/>
+              <a:t>But once you see the light, once you come out of the other side of the tunnel, you will emerge a new, woke coder.</a:t>
+            </a:r>
+          </a:p>
+        </p:txBody>
+      </p:sp>
+    </p:spTree>
+    <p:extLst>
+      <p:ext uri="{BB962C8B-B14F-4D97-AF65-F5344CB8AC3E}">
+        <p14:creationId xmlns:p14="http://schemas.microsoft.com/office/powerpoint/2010/main" val="3113237728"/>
+      </p:ext>
+    </p:extLst>
+  </p:cSld>
+  <p:clrMapOvr>
+    <a:masterClrMapping/>
+  </p:clrMapOvr>
+</p:sld>
+</file>
+
+<file path=ppt/slides/slide25.xml><?xml version="1.0" encoding="utf-8"?>
+<p:sld xmlns:a="http://schemas.openxmlformats.org/drawingml/2006/main" xmlns:r="http://schemas.openxmlformats.org/officeDocument/2006/relationships" xmlns:p="http://schemas.openxmlformats.org/presentationml/2006/main">
+  <p:cSld>
+    <p:spTree>
+      <p:nvGrpSpPr>
+        <p:cNvPr id="1" name=""/>
+        <p:cNvGrpSpPr/>
+        <p:nvPr/>
+      </p:nvGrpSpPr>
+      <p:grpSpPr>
+        <a:xfrm>
+          <a:off x="0" y="0"/>
+          <a:ext cx="0" cy="0"/>
+          <a:chOff x="0" y="0"/>
+          <a:chExt cx="0" cy="0"/>
+        </a:xfrm>
+      </p:grpSpPr>
+      <p:sp>
+        <p:nvSpPr>
+          <p:cNvPr id="2" name="Title 1">
+            <a:extLst>
+              <a:ext uri="{FF2B5EF4-FFF2-40B4-BE49-F238E27FC236}">
+                <a16:creationId xmlns:a16="http://schemas.microsoft.com/office/drawing/2014/main" id="{3EB990AF-6DAC-4027-94C9-16965B36BD03}"/>
+              </a:ext>
+            </a:extLst>
+          </p:cNvPr>
+          <p:cNvSpPr>
+            <a:spLocks noGrp="1"/>
+          </p:cNvSpPr>
+          <p:nvPr>
+            <p:ph type="title"/>
+          </p:nvPr>
+        </p:nvSpPr>
+        <p:spPr/>
+        <p:txBody>
+          <a:bodyPr/>
+          <a:lstStyle/>
+          <a:p>
+            <a:r>
+              <a:rPr lang="en-AU" dirty="0"/>
+              <a:t>Further study</a:t>
+            </a:r>
+          </a:p>
+        </p:txBody>
+      </p:sp>
+      <p:sp>
+        <p:nvSpPr>
+          <p:cNvPr id="3" name="Content Placeholder 2">
+            <a:extLst>
+              <a:ext uri="{FF2B5EF4-FFF2-40B4-BE49-F238E27FC236}">
+                <a16:creationId xmlns:a16="http://schemas.microsoft.com/office/drawing/2014/main" id="{8F7BCD7B-BFD6-459A-BBFE-F3D8163E879B}"/>
+              </a:ext>
+            </a:extLst>
+          </p:cNvPr>
+          <p:cNvSpPr>
+            <a:spLocks noGrp="1"/>
+          </p:cNvSpPr>
+          <p:nvPr>
+            <p:ph idx="1"/>
+          </p:nvPr>
+        </p:nvSpPr>
+        <p:spPr/>
+        <p:txBody>
+          <a:bodyPr/>
+          <a:lstStyle/>
+          <a:p>
+            <a:r>
+              <a:rPr lang="en-AU" dirty="0"/>
+              <a:t>`</a:t>
+            </a:r>
+            <a:r>
+              <a:rPr lang="en-AU" dirty="0" err="1"/>
+              <a:t>vimtutor</a:t>
+            </a:r>
+            <a:r>
+              <a:rPr lang="en-AU" dirty="0"/>
+              <a:t>`</a:t>
+            </a:r>
+          </a:p>
+          <a:p>
+            <a:r>
+              <a:rPr lang="en-AU" dirty="0"/>
+              <a:t>This talk’s recording</a:t>
+            </a:r>
+          </a:p>
+          <a:p>
+            <a:r>
+              <a:rPr lang="en-AU" dirty="0"/>
+              <a:t>The </a:t>
+            </a:r>
+            <a:r>
+              <a:rPr lang="en-AU" dirty="0" err="1"/>
+              <a:t>Primeagen</a:t>
+            </a:r>
+            <a:r>
+              <a:rPr lang="en-AU" dirty="0"/>
+              <a:t> </a:t>
+            </a:r>
+            <a:r>
+              <a:rPr lang="en-AU" dirty="0">
+                <a:hlinkClick r:id="rId2"/>
+              </a:rPr>
+              <a:t>https://www.youtube.com/channel/UC8ENHE5xdFSwx71u3fDH5Xw</a:t>
+            </a:r>
+            <a:r>
+              <a:rPr lang="en-AU" dirty="0"/>
+              <a:t> </a:t>
+            </a:r>
+          </a:p>
+          <a:p>
+            <a:r>
+              <a:rPr lang="en-AU" dirty="0">
+                <a:hlinkClick r:id="rId3"/>
+              </a:rPr>
+              <a:t>https://vim-adventures.com/</a:t>
+            </a:r>
+            <a:endParaRPr lang="en-AU" dirty="0"/>
+          </a:p>
+          <a:p>
+            <a:endParaRPr lang="en-AU" dirty="0"/>
+          </a:p>
+        </p:txBody>
+      </p:sp>
+    </p:spTree>
+    <p:extLst>
+      <p:ext uri="{BB962C8B-B14F-4D97-AF65-F5344CB8AC3E}">
+        <p14:creationId xmlns:p14="http://schemas.microsoft.com/office/powerpoint/2010/main" val="1737770106"/>
       </p:ext>
     </p:extLst>
   </p:cSld>
@@ -10967,10 +12886,10 @@
       </p:grpSpPr>
       <p:pic>
         <p:nvPicPr>
-          <p:cNvPr id="12" name="Picture 11">
+          <p:cNvPr id="3" name="Picture 2">
             <a:extLst>
               <a:ext uri="{FF2B5EF4-FFF2-40B4-BE49-F238E27FC236}">
-                <a16:creationId xmlns:a16="http://schemas.microsoft.com/office/drawing/2014/main" id="{67429AC4-2667-4D32-B622-ABFA44023D7D}"/>
+                <a16:creationId xmlns:a16="http://schemas.microsoft.com/office/drawing/2014/main" id="{1E9E30A2-1E22-4686-95C5-81015D6E28EA}"/>
               </a:ext>
             </a:extLst>
           </p:cNvPr>
@@ -10987,8 +12906,8 @@
         </p:blipFill>
         <p:spPr>
           <a:xfrm>
-            <a:off x="3437220" y="0"/>
-            <a:ext cx="5317560" cy="6858000"/>
+            <a:off x="3423138" y="0"/>
+            <a:ext cx="5345723" cy="6858000"/>
           </a:xfrm>
           <a:prstGeom prst="rect">
             <a:avLst/>

</xml_diff>